<commit_message>
Update: improved the changes and misc and group reflection slides
</commit_message>
<xml_diff>
--- a/Milestone 3/ENSE 470 Milestone 3.pptx
+++ b/Milestone 3/ENSE 470 Milestone 3.pptx
@@ -7,8 +7,8 @@
   <p:sldIdLst>
     <p:sldId id="256" r:id="rId2"/>
     <p:sldId id="257" r:id="rId3"/>
-    <p:sldId id="258" r:id="rId4"/>
-    <p:sldId id="259" r:id="rId5"/>
+    <p:sldId id="259" r:id="rId4"/>
+    <p:sldId id="261" r:id="rId5"/>
     <p:sldId id="260" r:id="rId6"/>
   </p:sldIdLst>
   <p:sldSz cx="12192000" cy="6858000"/>
@@ -108,6 +108,11 @@
       </a:defRPr>
     </a:lvl9pPr>
   </p:defaultTextStyle>
+  <p:extLst>
+    <p:ext uri="{EFAFB233-063F-42B5-8137-9DF3F51BA10A}">
+      <p15:sldGuideLst xmlns:p15="http://schemas.microsoft.com/office/powerpoint/2012/main"/>
+    </p:ext>
+  </p:extLst>
 </p:presentation>
 </file>
 
@@ -165,7 +170,7 @@
           <a:noFill/>
           <a:extLst>
             <a:ext uri="{909E8E84-426E-40dd-AFC4-6F175D3DCCD1}">
-              <a14:hiddenFill xmlns:a14="http://schemas.microsoft.com/office/drawing/2010/main" xmlns="">
+              <a14:hiddenFill xmlns="" xmlns:a14="http://schemas.microsoft.com/office/drawing/2010/main">
                 <a:solidFill>
                   <a:srgbClr val="FFFFFF"/>
                 </a:solidFill>
@@ -225,7 +230,7 @@
             </a:ln>
             <a:extLst>
               <a:ext uri="{91240B29-F687-4f45-9708-019B960494DF}">
-                <a14:hiddenLine xmlns:a14="http://schemas.microsoft.com/office/drawing/2010/main" xmlns="" w="9525">
+                <a14:hiddenLine xmlns="" xmlns:a14="http://schemas.microsoft.com/office/drawing/2010/main" w="9525">
                   <a:solidFill>
                     <a:srgbClr val="000000"/>
                   </a:solidFill>
@@ -315,7 +320,7 @@
             </a:ln>
             <a:extLst>
               <a:ext uri="{91240B29-F687-4f45-9708-019B960494DF}">
-                <a14:hiddenLine xmlns:a14="http://schemas.microsoft.com/office/drawing/2010/main" xmlns="" w="9525">
+                <a14:hiddenLine xmlns="" xmlns:a14="http://schemas.microsoft.com/office/drawing/2010/main" w="9525">
                   <a:solidFill>
                     <a:srgbClr val="000000"/>
                   </a:solidFill>
@@ -405,7 +410,7 @@
             </a:ln>
             <a:extLst>
               <a:ext uri="{91240B29-F687-4f45-9708-019B960494DF}">
-                <a14:hiddenLine xmlns:a14="http://schemas.microsoft.com/office/drawing/2010/main" xmlns="" w="9525">
+                <a14:hiddenLine xmlns="" xmlns:a14="http://schemas.microsoft.com/office/drawing/2010/main" w="9525">
                   <a:solidFill>
                     <a:srgbClr val="000000"/>
                   </a:solidFill>
@@ -439,7 +444,7 @@
             </a:ln>
             <a:extLst>
               <a:ext uri="{91240B29-F687-4f45-9708-019B960494DF}">
-                <a14:hiddenLine xmlns:a14="http://schemas.microsoft.com/office/drawing/2010/main" xmlns="" w="9525">
+                <a14:hiddenLine xmlns="" xmlns:a14="http://schemas.microsoft.com/office/drawing/2010/main" w="9525">
                   <a:solidFill>
                     <a:srgbClr val="000000"/>
                   </a:solidFill>
@@ -529,7 +534,7 @@
             </a:ln>
             <a:extLst>
               <a:ext uri="{91240B29-F687-4f45-9708-019B960494DF}">
-                <a14:hiddenLine xmlns:a14="http://schemas.microsoft.com/office/drawing/2010/main" xmlns="" w="9525">
+                <a14:hiddenLine xmlns="" xmlns:a14="http://schemas.microsoft.com/office/drawing/2010/main" w="9525">
                   <a:solidFill>
                     <a:srgbClr val="000000"/>
                   </a:solidFill>
@@ -591,7 +596,7 @@
             </a:ln>
             <a:extLst>
               <a:ext uri="{91240B29-F687-4f45-9708-019B960494DF}">
-                <a14:hiddenLine xmlns:a14="http://schemas.microsoft.com/office/drawing/2010/main" xmlns="" w="9525">
+                <a14:hiddenLine xmlns="" xmlns:a14="http://schemas.microsoft.com/office/drawing/2010/main" w="9525">
                   <a:solidFill>
                     <a:srgbClr val="000000"/>
                   </a:solidFill>
@@ -653,7 +658,7 @@
             </a:ln>
             <a:extLst>
               <a:ext uri="{91240B29-F687-4f45-9708-019B960494DF}">
-                <a14:hiddenLine xmlns:a14="http://schemas.microsoft.com/office/drawing/2010/main" xmlns="" w="9525">
+                <a14:hiddenLine xmlns="" xmlns:a14="http://schemas.microsoft.com/office/drawing/2010/main" w="9525">
                   <a:solidFill>
                     <a:srgbClr val="000000"/>
                   </a:solidFill>
@@ -743,7 +748,7 @@
             </a:ln>
             <a:extLst>
               <a:ext uri="{91240B29-F687-4f45-9708-019B960494DF}">
-                <a14:hiddenLine xmlns:a14="http://schemas.microsoft.com/office/drawing/2010/main" xmlns="" w="9525">
+                <a14:hiddenLine xmlns="" xmlns:a14="http://schemas.microsoft.com/office/drawing/2010/main" w="9525">
                   <a:solidFill>
                     <a:srgbClr val="000000"/>
                   </a:solidFill>
@@ -805,7 +810,7 @@
             </a:ln>
             <a:extLst>
               <a:ext uri="{91240B29-F687-4f45-9708-019B960494DF}">
-                <a14:hiddenLine xmlns:a14="http://schemas.microsoft.com/office/drawing/2010/main" xmlns="" w="9525">
+                <a14:hiddenLine xmlns="" xmlns:a14="http://schemas.microsoft.com/office/drawing/2010/main" w="9525">
                   <a:solidFill>
                     <a:srgbClr val="000000"/>
                   </a:solidFill>
@@ -867,7 +872,7 @@
             </a:ln>
             <a:extLst>
               <a:ext uri="{91240B29-F687-4f45-9708-019B960494DF}">
-                <a14:hiddenLine xmlns:a14="http://schemas.microsoft.com/office/drawing/2010/main" xmlns="" w="9525">
+                <a14:hiddenLine xmlns="" xmlns:a14="http://schemas.microsoft.com/office/drawing/2010/main" w="9525">
                   <a:solidFill>
                     <a:srgbClr val="000000"/>
                   </a:solidFill>
@@ -957,7 +962,7 @@
             </a:ln>
             <a:extLst>
               <a:ext uri="{91240B29-F687-4f45-9708-019B960494DF}">
-                <a14:hiddenLine xmlns:a14="http://schemas.microsoft.com/office/drawing/2010/main" xmlns="" w="9525">
+                <a14:hiddenLine xmlns="" xmlns:a14="http://schemas.microsoft.com/office/drawing/2010/main" w="9525">
                   <a:solidFill>
                     <a:srgbClr val="000000"/>
                   </a:solidFill>
@@ -1047,7 +1052,7 @@
             </a:ln>
             <a:extLst>
               <a:ext uri="{91240B29-F687-4f45-9708-019B960494DF}">
-                <a14:hiddenLine xmlns:a14="http://schemas.microsoft.com/office/drawing/2010/main" xmlns="" w="9525">
+                <a14:hiddenLine xmlns="" xmlns:a14="http://schemas.microsoft.com/office/drawing/2010/main" w="9525">
                   <a:solidFill>
                     <a:srgbClr val="000000"/>
                   </a:solidFill>
@@ -1109,7 +1114,7 @@
             </a:ln>
             <a:extLst>
               <a:ext uri="{91240B29-F687-4f45-9708-019B960494DF}">
-                <a14:hiddenLine xmlns:a14="http://schemas.microsoft.com/office/drawing/2010/main" xmlns="" w="9525">
+                <a14:hiddenLine xmlns="" xmlns:a14="http://schemas.microsoft.com/office/drawing/2010/main" w="9525">
                   <a:solidFill>
                     <a:srgbClr val="000000"/>
                   </a:solidFill>
@@ -1219,7 +1224,7 @@
             </a:ln>
             <a:extLst>
               <a:ext uri="{91240B29-F687-4f45-9708-019B960494DF}">
-                <a14:hiddenLine xmlns:a14="http://schemas.microsoft.com/office/drawing/2010/main" xmlns="" w="9525">
+                <a14:hiddenLine xmlns="" xmlns:a14="http://schemas.microsoft.com/office/drawing/2010/main" w="9525">
                   <a:solidFill>
                     <a:srgbClr val="000000"/>
                   </a:solidFill>
@@ -1281,7 +1286,7 @@
             </a:ln>
             <a:extLst>
               <a:ext uri="{91240B29-F687-4f45-9708-019B960494DF}">
-                <a14:hiddenLine xmlns:a14="http://schemas.microsoft.com/office/drawing/2010/main" xmlns="" w="9525">
+                <a14:hiddenLine xmlns="" xmlns:a14="http://schemas.microsoft.com/office/drawing/2010/main" w="9525">
                   <a:solidFill>
                     <a:srgbClr val="000000"/>
                   </a:solidFill>
@@ -1371,7 +1376,7 @@
             </a:ln>
             <a:extLst>
               <a:ext uri="{91240B29-F687-4f45-9708-019B960494DF}">
-                <a14:hiddenLine xmlns:a14="http://schemas.microsoft.com/office/drawing/2010/main" xmlns="" w="9525">
+                <a14:hiddenLine xmlns="" xmlns:a14="http://schemas.microsoft.com/office/drawing/2010/main" w="9525">
                   <a:solidFill>
                     <a:srgbClr val="000000"/>
                   </a:solidFill>
@@ -1461,7 +1466,7 @@
             </a:ln>
             <a:extLst>
               <a:ext uri="{91240B29-F687-4f45-9708-019B960494DF}">
-                <a14:hiddenLine xmlns:a14="http://schemas.microsoft.com/office/drawing/2010/main" xmlns="" w="9525">
+                <a14:hiddenLine xmlns="" xmlns:a14="http://schemas.microsoft.com/office/drawing/2010/main" w="9525">
                   <a:solidFill>
                     <a:srgbClr val="000000"/>
                   </a:solidFill>
@@ -1523,7 +1528,7 @@
             </a:ln>
             <a:extLst>
               <a:ext uri="{91240B29-F687-4f45-9708-019B960494DF}">
-                <a14:hiddenLine xmlns:a14="http://schemas.microsoft.com/office/drawing/2010/main" xmlns="" w="9525">
+                <a14:hiddenLine xmlns="" xmlns:a14="http://schemas.microsoft.com/office/drawing/2010/main" w="9525">
                   <a:solidFill>
                     <a:srgbClr val="000000"/>
                   </a:solidFill>
@@ -1613,7 +1618,7 @@
             </a:ln>
             <a:extLst>
               <a:ext uri="{91240B29-F687-4f45-9708-019B960494DF}">
-                <a14:hiddenLine xmlns:a14="http://schemas.microsoft.com/office/drawing/2010/main" xmlns="" w="9525">
+                <a14:hiddenLine xmlns="" xmlns:a14="http://schemas.microsoft.com/office/drawing/2010/main" w="9525">
                   <a:solidFill>
                     <a:srgbClr val="000000"/>
                   </a:solidFill>
@@ -1703,7 +1708,7 @@
             </a:ln>
             <a:extLst>
               <a:ext uri="{91240B29-F687-4f45-9708-019B960494DF}">
-                <a14:hiddenLine xmlns:a14="http://schemas.microsoft.com/office/drawing/2010/main" xmlns="" w="9525">
+                <a14:hiddenLine xmlns="" xmlns:a14="http://schemas.microsoft.com/office/drawing/2010/main" w="9525">
                   <a:solidFill>
                     <a:srgbClr val="000000"/>
                   </a:solidFill>
@@ -1759,7 +1764,7 @@
             </a:ln>
             <a:extLst>
               <a:ext uri="{91240B29-F687-4f45-9708-019B960494DF}">
-                <a14:hiddenLine xmlns:a14="http://schemas.microsoft.com/office/drawing/2010/main" xmlns="" w="9525">
+                <a14:hiddenLine xmlns="" xmlns:a14="http://schemas.microsoft.com/office/drawing/2010/main" w="9525">
                   <a:solidFill>
                     <a:srgbClr val="000000"/>
                   </a:solidFill>
@@ -1849,7 +1854,7 @@
             </a:ln>
             <a:extLst>
               <a:ext uri="{91240B29-F687-4f45-9708-019B960494DF}">
-                <a14:hiddenLine xmlns:a14="http://schemas.microsoft.com/office/drawing/2010/main" xmlns="" w="9525">
+                <a14:hiddenLine xmlns="" xmlns:a14="http://schemas.microsoft.com/office/drawing/2010/main" w="9525">
                   <a:solidFill>
                     <a:srgbClr val="000000"/>
                   </a:solidFill>
@@ -1905,7 +1910,7 @@
             </a:ln>
             <a:extLst>
               <a:ext uri="{91240B29-F687-4f45-9708-019B960494DF}">
-                <a14:hiddenLine xmlns:a14="http://schemas.microsoft.com/office/drawing/2010/main" xmlns="" w="9525">
+                <a14:hiddenLine xmlns="" xmlns:a14="http://schemas.microsoft.com/office/drawing/2010/main" w="9525">
                   <a:solidFill>
                     <a:srgbClr val="000000"/>
                   </a:solidFill>
@@ -1995,7 +2000,7 @@
             </a:ln>
             <a:extLst>
               <a:ext uri="{91240B29-F687-4f45-9708-019B960494DF}">
-                <a14:hiddenLine xmlns:a14="http://schemas.microsoft.com/office/drawing/2010/main" xmlns="" w="9525">
+                <a14:hiddenLine xmlns="" xmlns:a14="http://schemas.microsoft.com/office/drawing/2010/main" w="9525">
                   <a:solidFill>
                     <a:srgbClr val="000000"/>
                   </a:solidFill>
@@ -2063,7 +2068,7 @@
             </a:ln>
             <a:extLst>
               <a:ext uri="{91240B29-F687-4f45-9708-019B960494DF}">
-                <a14:hiddenLine xmlns:a14="http://schemas.microsoft.com/office/drawing/2010/main" xmlns="" w="9525">
+                <a14:hiddenLine xmlns="" xmlns:a14="http://schemas.microsoft.com/office/drawing/2010/main" w="9525">
                   <a:solidFill>
                     <a:srgbClr val="000000"/>
                   </a:solidFill>
@@ -2153,7 +2158,7 @@
             </a:ln>
             <a:extLst>
               <a:ext uri="{91240B29-F687-4f45-9708-019B960494DF}">
-                <a14:hiddenLine xmlns:a14="http://schemas.microsoft.com/office/drawing/2010/main" xmlns="" w="9525">
+                <a14:hiddenLine xmlns="" xmlns:a14="http://schemas.microsoft.com/office/drawing/2010/main" w="9525">
                   <a:solidFill>
                     <a:srgbClr val="000000"/>
                   </a:solidFill>
@@ -2221,7 +2226,7 @@
             </a:ln>
             <a:extLst>
               <a:ext uri="{91240B29-F687-4f45-9708-019B960494DF}">
-                <a14:hiddenLine xmlns:a14="http://schemas.microsoft.com/office/drawing/2010/main" xmlns="" w="9525">
+                <a14:hiddenLine xmlns="" xmlns:a14="http://schemas.microsoft.com/office/drawing/2010/main" w="9525">
                   <a:solidFill>
                     <a:srgbClr val="000000"/>
                   </a:solidFill>
@@ -2311,7 +2316,7 @@
             </a:ln>
             <a:extLst>
               <a:ext uri="{91240B29-F687-4f45-9708-019B960494DF}">
-                <a14:hiddenLine xmlns:a14="http://schemas.microsoft.com/office/drawing/2010/main" xmlns="" w="9525">
+                <a14:hiddenLine xmlns="" xmlns:a14="http://schemas.microsoft.com/office/drawing/2010/main" w="9525">
                   <a:solidFill>
                     <a:srgbClr val="000000"/>
                   </a:solidFill>
@@ -2345,7 +2350,7 @@
             </a:ln>
             <a:extLst>
               <a:ext uri="{91240B29-F687-4f45-9708-019B960494DF}">
-                <a14:hiddenLine xmlns:a14="http://schemas.microsoft.com/office/drawing/2010/main" xmlns="" w="9525">
+                <a14:hiddenLine xmlns="" xmlns:a14="http://schemas.microsoft.com/office/drawing/2010/main" w="9525">
                   <a:solidFill>
                     <a:srgbClr val="000000"/>
                   </a:solidFill>
@@ -2435,7 +2440,7 @@
             </a:ln>
             <a:extLst>
               <a:ext uri="{91240B29-F687-4f45-9708-019B960494DF}">
-                <a14:hiddenLine xmlns:a14="http://schemas.microsoft.com/office/drawing/2010/main" xmlns="" w="9525">
+                <a14:hiddenLine xmlns="" xmlns:a14="http://schemas.microsoft.com/office/drawing/2010/main" w="9525">
                   <a:solidFill>
                     <a:srgbClr val="000000"/>
                   </a:solidFill>
@@ -2497,7 +2502,7 @@
             </a:ln>
             <a:extLst>
               <a:ext uri="{91240B29-F687-4f45-9708-019B960494DF}">
-                <a14:hiddenLine xmlns:a14="http://schemas.microsoft.com/office/drawing/2010/main" xmlns="" w="9525">
+                <a14:hiddenLine xmlns="" xmlns:a14="http://schemas.microsoft.com/office/drawing/2010/main" w="9525">
                   <a:solidFill>
                     <a:srgbClr val="000000"/>
                   </a:solidFill>
@@ -2559,7 +2564,7 @@
             </a:ln>
             <a:extLst>
               <a:ext uri="{91240B29-F687-4f45-9708-019B960494DF}">
-                <a14:hiddenLine xmlns:a14="http://schemas.microsoft.com/office/drawing/2010/main" xmlns="" w="9525">
+                <a14:hiddenLine xmlns="" xmlns:a14="http://schemas.microsoft.com/office/drawing/2010/main" w="9525">
                   <a:solidFill>
                     <a:srgbClr val="000000"/>
                   </a:solidFill>
@@ -2649,7 +2654,7 @@
             </a:ln>
             <a:extLst>
               <a:ext uri="{91240B29-F687-4f45-9708-019B960494DF}">
-                <a14:hiddenLine xmlns:a14="http://schemas.microsoft.com/office/drawing/2010/main" xmlns="" w="9525">
+                <a14:hiddenLine xmlns="" xmlns:a14="http://schemas.microsoft.com/office/drawing/2010/main" w="9525">
                   <a:solidFill>
                     <a:srgbClr val="000000"/>
                   </a:solidFill>
@@ -2717,7 +2722,7 @@
             </a:ln>
             <a:extLst>
               <a:ext uri="{91240B29-F687-4f45-9708-019B960494DF}">
-                <a14:hiddenLine xmlns:a14="http://schemas.microsoft.com/office/drawing/2010/main" xmlns="" w="9525">
+                <a14:hiddenLine xmlns="" xmlns:a14="http://schemas.microsoft.com/office/drawing/2010/main" w="9525">
                   <a:solidFill>
                     <a:srgbClr val="000000"/>
                   </a:solidFill>
@@ -2779,7 +2784,7 @@
             </a:ln>
             <a:extLst>
               <a:ext uri="{91240B29-F687-4f45-9708-019B960494DF}">
-                <a14:hiddenLine xmlns:a14="http://schemas.microsoft.com/office/drawing/2010/main" xmlns="" w="9525">
+                <a14:hiddenLine xmlns="" xmlns:a14="http://schemas.microsoft.com/office/drawing/2010/main" w="9525">
                   <a:solidFill>
                     <a:srgbClr val="000000"/>
                   </a:solidFill>
@@ -2869,7 +2874,7 @@
             </a:ln>
             <a:extLst>
               <a:ext uri="{91240B29-F687-4f45-9708-019B960494DF}">
-                <a14:hiddenLine xmlns:a14="http://schemas.microsoft.com/office/drawing/2010/main" xmlns="" w="9525">
+                <a14:hiddenLine xmlns="" xmlns:a14="http://schemas.microsoft.com/office/drawing/2010/main" w="9525">
                   <a:solidFill>
                     <a:srgbClr val="000000"/>
                   </a:solidFill>
@@ -2931,7 +2936,7 @@
             </a:ln>
             <a:extLst>
               <a:ext uri="{91240B29-F687-4f45-9708-019B960494DF}">
-                <a14:hiddenLine xmlns:a14="http://schemas.microsoft.com/office/drawing/2010/main" xmlns="" w="9525">
+                <a14:hiddenLine xmlns="" xmlns:a14="http://schemas.microsoft.com/office/drawing/2010/main" w="9525">
                   <a:solidFill>
                     <a:srgbClr val="000000"/>
                   </a:solidFill>
@@ -3021,7 +3026,7 @@
             </a:ln>
             <a:extLst>
               <a:ext uri="{91240B29-F687-4f45-9708-019B960494DF}">
-                <a14:hiddenLine xmlns:a14="http://schemas.microsoft.com/office/drawing/2010/main" xmlns="" w="9525">
+                <a14:hiddenLine xmlns="" xmlns:a14="http://schemas.microsoft.com/office/drawing/2010/main" w="9525">
                   <a:solidFill>
                     <a:srgbClr val="000000"/>
                   </a:solidFill>
@@ -3083,7 +3088,7 @@
             </a:ln>
             <a:extLst>
               <a:ext uri="{91240B29-F687-4f45-9708-019B960494DF}">
-                <a14:hiddenLine xmlns:a14="http://schemas.microsoft.com/office/drawing/2010/main" xmlns="" w="9525">
+                <a14:hiddenLine xmlns="" xmlns:a14="http://schemas.microsoft.com/office/drawing/2010/main" w="9525">
                   <a:solidFill>
                     <a:srgbClr val="000000"/>
                   </a:solidFill>
@@ -3173,7 +3178,7 @@
             </a:ln>
             <a:extLst>
               <a:ext uri="{91240B29-F687-4f45-9708-019B960494DF}">
-                <a14:hiddenLine xmlns:a14="http://schemas.microsoft.com/office/drawing/2010/main" xmlns="" w="9525">
+                <a14:hiddenLine xmlns="" xmlns:a14="http://schemas.microsoft.com/office/drawing/2010/main" w="9525">
                   <a:solidFill>
                     <a:srgbClr val="000000"/>
                   </a:solidFill>
@@ -3207,7 +3212,7 @@
             </a:ln>
             <a:extLst>
               <a:ext uri="{91240B29-F687-4f45-9708-019B960494DF}">
-                <a14:hiddenLine xmlns:a14="http://schemas.microsoft.com/office/drawing/2010/main" xmlns="" w="9525">
+                <a14:hiddenLine xmlns="" xmlns:a14="http://schemas.microsoft.com/office/drawing/2010/main" w="9525">
                   <a:solidFill>
                     <a:srgbClr val="000000"/>
                   </a:solidFill>
@@ -3272,7 +3277,7 @@
             </a:ln>
             <a:extLst>
               <a:ext uri="{91240B29-F687-4f45-9708-019B960494DF}">
-                <a14:hiddenLine xmlns:a14="http://schemas.microsoft.com/office/drawing/2010/main" xmlns="" w="9525">
+                <a14:hiddenLine xmlns="" xmlns:a14="http://schemas.microsoft.com/office/drawing/2010/main" w="9525">
                   <a:solidFill>
                     <a:srgbClr val="000000"/>
                   </a:solidFill>
@@ -3362,7 +3367,7 @@
             </a:ln>
             <a:extLst>
               <a:ext uri="{91240B29-F687-4f45-9708-019B960494DF}">
-                <a14:hiddenLine xmlns:a14="http://schemas.microsoft.com/office/drawing/2010/main" xmlns="" w="9525">
+                <a14:hiddenLine xmlns="" xmlns:a14="http://schemas.microsoft.com/office/drawing/2010/main" w="9525">
                   <a:solidFill>
                     <a:srgbClr val="000000"/>
                   </a:solidFill>
@@ -3424,7 +3429,7 @@
             </a:ln>
             <a:extLst>
               <a:ext uri="{91240B29-F687-4f45-9708-019B960494DF}">
-                <a14:hiddenLine xmlns:a14="http://schemas.microsoft.com/office/drawing/2010/main" xmlns="" w="9525">
+                <a14:hiddenLine xmlns="" xmlns:a14="http://schemas.microsoft.com/office/drawing/2010/main" w="9525">
                   <a:solidFill>
                     <a:srgbClr val="000000"/>
                   </a:solidFill>
@@ -3514,7 +3519,7 @@
             </a:ln>
             <a:extLst>
               <a:ext uri="{91240B29-F687-4f45-9708-019B960494DF}">
-                <a14:hiddenLine xmlns:a14="http://schemas.microsoft.com/office/drawing/2010/main" xmlns="" w="9525">
+                <a14:hiddenLine xmlns="" xmlns:a14="http://schemas.microsoft.com/office/drawing/2010/main" w="9525">
                   <a:solidFill>
                     <a:srgbClr val="000000"/>
                   </a:solidFill>
@@ -3604,7 +3609,7 @@
             </a:ln>
             <a:extLst>
               <a:ext uri="{91240B29-F687-4f45-9708-019B960494DF}">
-                <a14:hiddenLine xmlns:a14="http://schemas.microsoft.com/office/drawing/2010/main" xmlns="" w="9525">
+                <a14:hiddenLine xmlns="" xmlns:a14="http://schemas.microsoft.com/office/drawing/2010/main" w="9525">
                   <a:solidFill>
                     <a:srgbClr val="000000"/>
                   </a:solidFill>
@@ -3669,7 +3674,7 @@
             </a:ln>
             <a:extLst>
               <a:ext uri="{91240B29-F687-4f45-9708-019B960494DF}">
-                <a14:hiddenLine xmlns:a14="http://schemas.microsoft.com/office/drawing/2010/main" xmlns="" w="9525">
+                <a14:hiddenLine xmlns="" xmlns:a14="http://schemas.microsoft.com/office/drawing/2010/main" w="9525">
                   <a:solidFill>
                     <a:srgbClr val="000000"/>
                   </a:solidFill>
@@ -3731,7 +3736,7 @@
             </a:ln>
             <a:extLst>
               <a:ext uri="{91240B29-F687-4f45-9708-019B960494DF}">
-                <a14:hiddenLine xmlns:a14="http://schemas.microsoft.com/office/drawing/2010/main" xmlns="" w="9525">
+                <a14:hiddenLine xmlns="" xmlns:a14="http://schemas.microsoft.com/office/drawing/2010/main" w="9525">
                   <a:solidFill>
                     <a:srgbClr val="000000"/>
                   </a:solidFill>
@@ -3821,7 +3826,7 @@
             </a:ln>
             <a:extLst>
               <a:ext uri="{91240B29-F687-4f45-9708-019B960494DF}">
-                <a14:hiddenLine xmlns:a14="http://schemas.microsoft.com/office/drawing/2010/main" xmlns="" w="9525">
+                <a14:hiddenLine xmlns="" xmlns:a14="http://schemas.microsoft.com/office/drawing/2010/main" w="9525">
                   <a:solidFill>
                     <a:srgbClr val="000000"/>
                   </a:solidFill>
@@ -3911,7 +3916,7 @@
             </a:ln>
             <a:extLst>
               <a:ext uri="{91240B29-F687-4f45-9708-019B960494DF}">
-                <a14:hiddenLine xmlns:a14="http://schemas.microsoft.com/office/drawing/2010/main" xmlns="" w="9525">
+                <a14:hiddenLine xmlns="" xmlns:a14="http://schemas.microsoft.com/office/drawing/2010/main" w="9525">
                   <a:solidFill>
                     <a:srgbClr val="000000"/>
                   </a:solidFill>
@@ -3973,7 +3978,7 @@
             </a:ln>
             <a:extLst>
               <a:ext uri="{91240B29-F687-4f45-9708-019B960494DF}">
-                <a14:hiddenLine xmlns:a14="http://schemas.microsoft.com/office/drawing/2010/main" xmlns="" w="9525">
+                <a14:hiddenLine xmlns="" xmlns:a14="http://schemas.microsoft.com/office/drawing/2010/main" w="9525">
                   <a:solidFill>
                     <a:srgbClr val="000000"/>
                   </a:solidFill>
@@ -4093,7 +4098,7 @@
             </a:ln>
             <a:extLst>
               <a:ext uri="{91240B29-F687-4f45-9708-019B960494DF}">
-                <a14:hiddenLine xmlns:a14="http://schemas.microsoft.com/office/drawing/2010/main" xmlns="" w="9525">
+                <a14:hiddenLine xmlns="" xmlns:a14="http://schemas.microsoft.com/office/drawing/2010/main" w="9525">
                   <a:solidFill>
                     <a:srgbClr val="000000"/>
                   </a:solidFill>
@@ -4161,7 +4166,7 @@
             </a:ln>
             <a:extLst>
               <a:ext uri="{91240B29-F687-4f45-9708-019B960494DF}">
-                <a14:hiddenLine xmlns:a14="http://schemas.microsoft.com/office/drawing/2010/main" xmlns="" w="9525">
+                <a14:hiddenLine xmlns="" xmlns:a14="http://schemas.microsoft.com/office/drawing/2010/main" w="9525">
                   <a:solidFill>
                     <a:srgbClr val="000000"/>
                   </a:solidFill>
@@ -4251,7 +4256,7 @@
             </a:ln>
             <a:extLst>
               <a:ext uri="{91240B29-F687-4f45-9708-019B960494DF}">
-                <a14:hiddenLine xmlns:a14="http://schemas.microsoft.com/office/drawing/2010/main" xmlns="" w="9525">
+                <a14:hiddenLine xmlns="" xmlns:a14="http://schemas.microsoft.com/office/drawing/2010/main" w="9525">
                   <a:solidFill>
                     <a:srgbClr val="000000"/>
                   </a:solidFill>
@@ -4391,7 +4396,7 @@
           <a:p>
             <a:fld id="{B6416A5E-5CBD-41E4-8742-691F0FE399C2}" type="datetimeFigureOut">
               <a:rPr lang="en-CA" smtClean="0"/>
-              <a:t>2018-01-23</a:t>
+              <a:t>2018-01-31</a:t>
             </a:fld>
             <a:endParaRPr lang="en-CA"/>
           </a:p>
@@ -4658,7 +4663,7 @@
           <a:p>
             <a:fld id="{B6416A5E-5CBD-41E4-8742-691F0FE399C2}" type="datetimeFigureOut">
               <a:rPr lang="en-CA" smtClean="0"/>
-              <a:t>2018-01-23</a:t>
+              <a:t>2018-01-31</a:t>
             </a:fld>
             <a:endParaRPr lang="en-CA"/>
           </a:p>
@@ -4854,7 +4859,7 @@
           <a:p>
             <a:fld id="{B6416A5E-5CBD-41E4-8742-691F0FE399C2}" type="datetimeFigureOut">
               <a:rPr lang="en-CA" smtClean="0"/>
-              <a:t>2018-01-23</a:t>
+              <a:t>2018-01-31</a:t>
             </a:fld>
             <a:endParaRPr lang="en-CA"/>
           </a:p>
@@ -5117,7 +5122,7 @@
           <a:p>
             <a:fld id="{B6416A5E-5CBD-41E4-8742-691F0FE399C2}" type="datetimeFigureOut">
               <a:rPr lang="en-CA" smtClean="0"/>
-              <a:t>2018-01-23</a:t>
+              <a:t>2018-01-31</a:t>
             </a:fld>
             <a:endParaRPr lang="en-CA"/>
           </a:p>
@@ -5551,7 +5556,7 @@
           <a:p>
             <a:fld id="{B6416A5E-5CBD-41E4-8742-691F0FE399C2}" type="datetimeFigureOut">
               <a:rPr lang="en-CA" smtClean="0"/>
-              <a:t>2018-01-23</a:t>
+              <a:t>2018-01-31</a:t>
             </a:fld>
             <a:endParaRPr lang="en-CA"/>
           </a:p>
@@ -6097,7 +6102,7 @@
           <a:p>
             <a:fld id="{B6416A5E-5CBD-41E4-8742-691F0FE399C2}" type="datetimeFigureOut">
               <a:rPr lang="en-CA" smtClean="0"/>
-              <a:t>2018-01-23</a:t>
+              <a:t>2018-01-31</a:t>
             </a:fld>
             <a:endParaRPr lang="en-CA"/>
           </a:p>
@@ -6817,7 +6822,7 @@
           <a:p>
             <a:fld id="{B6416A5E-5CBD-41E4-8742-691F0FE399C2}" type="datetimeFigureOut">
               <a:rPr lang="en-CA" smtClean="0"/>
-              <a:t>2018-01-23</a:t>
+              <a:t>2018-01-31</a:t>
             </a:fld>
             <a:endParaRPr lang="en-CA"/>
           </a:p>
@@ -6987,7 +6992,7 @@
           <a:p>
             <a:fld id="{B6416A5E-5CBD-41E4-8742-691F0FE399C2}" type="datetimeFigureOut">
               <a:rPr lang="en-CA" smtClean="0"/>
-              <a:t>2018-01-23</a:t>
+              <a:t>2018-01-31</a:t>
             </a:fld>
             <a:endParaRPr lang="en-CA"/>
           </a:p>
@@ -7167,7 +7172,7 @@
           <a:p>
             <a:fld id="{B6416A5E-5CBD-41E4-8742-691F0FE399C2}" type="datetimeFigureOut">
               <a:rPr lang="en-CA" smtClean="0"/>
-              <a:t>2018-01-23</a:t>
+              <a:t>2018-01-31</a:t>
             </a:fld>
             <a:endParaRPr lang="en-CA"/>
           </a:p>
@@ -7337,7 +7342,7 @@
           <a:p>
             <a:fld id="{B6416A5E-5CBD-41E4-8742-691F0FE399C2}" type="datetimeFigureOut">
               <a:rPr lang="en-CA" smtClean="0"/>
-              <a:t>2018-01-23</a:t>
+              <a:t>2018-01-31</a:t>
             </a:fld>
             <a:endParaRPr lang="en-CA"/>
           </a:p>
@@ -7587,7 +7592,7 @@
           <a:p>
             <a:fld id="{B6416A5E-5CBD-41E4-8742-691F0FE399C2}" type="datetimeFigureOut">
               <a:rPr lang="en-CA" smtClean="0"/>
-              <a:t>2018-01-23</a:t>
+              <a:t>2018-01-31</a:t>
             </a:fld>
             <a:endParaRPr lang="en-CA"/>
           </a:p>
@@ -7819,7 +7824,7 @@
           <a:p>
             <a:fld id="{B6416A5E-5CBD-41E4-8742-691F0FE399C2}" type="datetimeFigureOut">
               <a:rPr lang="en-CA" smtClean="0"/>
-              <a:t>2018-01-23</a:t>
+              <a:t>2018-01-31</a:t>
             </a:fld>
             <a:endParaRPr lang="en-CA"/>
           </a:p>
@@ -8200,7 +8205,7 @@
           <a:p>
             <a:fld id="{B6416A5E-5CBD-41E4-8742-691F0FE399C2}" type="datetimeFigureOut">
               <a:rPr lang="en-CA" smtClean="0"/>
-              <a:t>2018-01-23</a:t>
+              <a:t>2018-01-31</a:t>
             </a:fld>
             <a:endParaRPr lang="en-CA"/>
           </a:p>
@@ -8318,7 +8323,7 @@
           <a:p>
             <a:fld id="{B6416A5E-5CBD-41E4-8742-691F0FE399C2}" type="datetimeFigureOut">
               <a:rPr lang="en-CA" smtClean="0"/>
-              <a:t>2018-01-23</a:t>
+              <a:t>2018-01-31</a:t>
             </a:fld>
             <a:endParaRPr lang="en-CA"/>
           </a:p>
@@ -8413,7 +8418,7 @@
           <a:p>
             <a:fld id="{B6416A5E-5CBD-41E4-8742-691F0FE399C2}" type="datetimeFigureOut">
               <a:rPr lang="en-CA" smtClean="0"/>
-              <a:t>2018-01-23</a:t>
+              <a:t>2018-01-31</a:t>
             </a:fld>
             <a:endParaRPr lang="en-CA"/>
           </a:p>
@@ -8662,7 +8667,7 @@
           <a:p>
             <a:fld id="{B6416A5E-5CBD-41E4-8742-691F0FE399C2}" type="datetimeFigureOut">
               <a:rPr lang="en-CA" smtClean="0"/>
-              <a:t>2018-01-23</a:t>
+              <a:t>2018-01-31</a:t>
             </a:fld>
             <a:endParaRPr lang="en-CA"/>
           </a:p>
@@ -8942,7 +8947,7 @@
           <a:p>
             <a:fld id="{B6416A5E-5CBD-41E4-8742-691F0FE399C2}" type="datetimeFigureOut">
               <a:rPr lang="en-CA" smtClean="0"/>
-              <a:t>2018-01-23</a:t>
+              <a:t>2018-01-31</a:t>
             </a:fld>
             <a:endParaRPr lang="en-CA"/>
           </a:p>
@@ -9058,7 +9063,7 @@
           <a:noFill/>
           <a:extLst>
             <a:ext uri="{909E8E84-426E-40dd-AFC4-6F175D3DCCD1}">
-              <a14:hiddenFill xmlns:a14="http://schemas.microsoft.com/office/drawing/2010/main" xmlns="">
+              <a14:hiddenFill xmlns="" xmlns:a14="http://schemas.microsoft.com/office/drawing/2010/main">
                 <a:solidFill>
                   <a:srgbClr val="FFFFFF"/>
                 </a:solidFill>
@@ -9132,7 +9137,7 @@
               </a:ln>
               <a:extLst>
                 <a:ext uri="{91240B29-F687-4f45-9708-019B960494DF}">
-                  <a14:hiddenLine xmlns:a14="http://schemas.microsoft.com/office/drawing/2010/main" xmlns="" w="9525">
+                  <a14:hiddenLine xmlns="" xmlns:a14="http://schemas.microsoft.com/office/drawing/2010/main" w="9525">
                     <a:solidFill>
                       <a:srgbClr val="000000"/>
                     </a:solidFill>
@@ -9222,7 +9227,7 @@
               </a:ln>
               <a:extLst>
                 <a:ext uri="{91240B29-F687-4f45-9708-019B960494DF}">
-                  <a14:hiddenLine xmlns:a14="http://schemas.microsoft.com/office/drawing/2010/main" xmlns="" w="9525">
+                  <a14:hiddenLine xmlns="" xmlns:a14="http://schemas.microsoft.com/office/drawing/2010/main" w="9525">
                     <a:solidFill>
                       <a:srgbClr val="000000"/>
                     </a:solidFill>
@@ -9312,7 +9317,7 @@
               </a:ln>
               <a:extLst>
                 <a:ext uri="{91240B29-F687-4f45-9708-019B960494DF}">
-                  <a14:hiddenLine xmlns:a14="http://schemas.microsoft.com/office/drawing/2010/main" xmlns="" w="9525">
+                  <a14:hiddenLine xmlns="" xmlns:a14="http://schemas.microsoft.com/office/drawing/2010/main" w="9525">
                     <a:solidFill>
                       <a:srgbClr val="000000"/>
                     </a:solidFill>
@@ -9374,7 +9379,7 @@
               </a:ln>
               <a:extLst>
                 <a:ext uri="{91240B29-F687-4f45-9708-019B960494DF}">
-                  <a14:hiddenLine xmlns:a14="http://schemas.microsoft.com/office/drawing/2010/main" xmlns="" w="9525">
+                  <a14:hiddenLine xmlns="" xmlns:a14="http://schemas.microsoft.com/office/drawing/2010/main" w="9525">
                     <a:solidFill>
                       <a:srgbClr val="000000"/>
                     </a:solidFill>
@@ -9464,7 +9469,7 @@
               </a:ln>
               <a:extLst>
                 <a:ext uri="{91240B29-F687-4f45-9708-019B960494DF}">
-                  <a14:hiddenLine xmlns:a14="http://schemas.microsoft.com/office/drawing/2010/main" xmlns="" w="9525">
+                  <a14:hiddenLine xmlns="" xmlns:a14="http://schemas.microsoft.com/office/drawing/2010/main" w="9525">
                     <a:solidFill>
                       <a:srgbClr val="000000"/>
                     </a:solidFill>
@@ -9526,7 +9531,7 @@
               </a:ln>
               <a:extLst>
                 <a:ext uri="{91240B29-F687-4f45-9708-019B960494DF}">
-                  <a14:hiddenLine xmlns:a14="http://schemas.microsoft.com/office/drawing/2010/main" xmlns="" w="9525">
+                  <a14:hiddenLine xmlns="" xmlns:a14="http://schemas.microsoft.com/office/drawing/2010/main" w="9525">
                     <a:solidFill>
                       <a:srgbClr val="000000"/>
                     </a:solidFill>
@@ -9588,7 +9593,7 @@
               </a:ln>
               <a:extLst>
                 <a:ext uri="{91240B29-F687-4f45-9708-019B960494DF}">
-                  <a14:hiddenLine xmlns:a14="http://schemas.microsoft.com/office/drawing/2010/main" xmlns="" w="9525">
+                  <a14:hiddenLine xmlns="" xmlns:a14="http://schemas.microsoft.com/office/drawing/2010/main" w="9525">
                     <a:solidFill>
                       <a:srgbClr val="000000"/>
                     </a:solidFill>
@@ -9678,7 +9683,7 @@
               </a:ln>
               <a:extLst>
                 <a:ext uri="{91240B29-F687-4f45-9708-019B960494DF}">
-                  <a14:hiddenLine xmlns:a14="http://schemas.microsoft.com/office/drawing/2010/main" xmlns="" w="9525">
+                  <a14:hiddenLine xmlns="" xmlns:a14="http://schemas.microsoft.com/office/drawing/2010/main" w="9525">
                     <a:solidFill>
                       <a:srgbClr val="000000"/>
                     </a:solidFill>
@@ -9768,7 +9773,7 @@
               </a:ln>
               <a:extLst>
                 <a:ext uri="{91240B29-F687-4f45-9708-019B960494DF}">
-                  <a14:hiddenLine xmlns:a14="http://schemas.microsoft.com/office/drawing/2010/main" xmlns="" w="9525">
+                  <a14:hiddenLine xmlns="" xmlns:a14="http://schemas.microsoft.com/office/drawing/2010/main" w="9525">
                     <a:solidFill>
                       <a:srgbClr val="000000"/>
                     </a:solidFill>
@@ -9830,7 +9835,7 @@
               </a:ln>
               <a:extLst>
                 <a:ext uri="{91240B29-F687-4f45-9708-019B960494DF}">
-                  <a14:hiddenLine xmlns:a14="http://schemas.microsoft.com/office/drawing/2010/main" xmlns="" w="9525">
+                  <a14:hiddenLine xmlns="" xmlns:a14="http://schemas.microsoft.com/office/drawing/2010/main" w="9525">
                     <a:solidFill>
                       <a:srgbClr val="000000"/>
                     </a:solidFill>
@@ -9940,7 +9945,7 @@
               </a:ln>
               <a:extLst>
                 <a:ext uri="{91240B29-F687-4f45-9708-019B960494DF}">
-                  <a14:hiddenLine xmlns:a14="http://schemas.microsoft.com/office/drawing/2010/main" xmlns="" w="9525">
+                  <a14:hiddenLine xmlns="" xmlns:a14="http://schemas.microsoft.com/office/drawing/2010/main" w="9525">
                     <a:solidFill>
                       <a:srgbClr val="000000"/>
                     </a:solidFill>
@@ -10024,7 +10029,7 @@
               </a:ln>
               <a:extLst>
                 <a:ext uri="{91240B29-F687-4f45-9708-019B960494DF}">
-                  <a14:hiddenLine xmlns:a14="http://schemas.microsoft.com/office/drawing/2010/main" xmlns="" w="9525">
+                  <a14:hiddenLine xmlns="" xmlns:a14="http://schemas.microsoft.com/office/drawing/2010/main" w="9525">
                     <a:solidFill>
                       <a:srgbClr val="000000"/>
                     </a:solidFill>
@@ -10086,7 +10091,7 @@
               </a:ln>
               <a:extLst>
                 <a:ext uri="{91240B29-F687-4f45-9708-019B960494DF}">
-                  <a14:hiddenLine xmlns:a14="http://schemas.microsoft.com/office/drawing/2010/main" xmlns="" w="9525">
+                  <a14:hiddenLine xmlns="" xmlns:a14="http://schemas.microsoft.com/office/drawing/2010/main" w="9525">
                     <a:solidFill>
                       <a:srgbClr val="000000"/>
                     </a:solidFill>
@@ -10148,7 +10153,7 @@
               </a:ln>
               <a:extLst>
                 <a:ext uri="{91240B29-F687-4f45-9708-019B960494DF}">
-                  <a14:hiddenLine xmlns:a14="http://schemas.microsoft.com/office/drawing/2010/main" xmlns="" w="9525">
+                  <a14:hiddenLine xmlns="" xmlns:a14="http://schemas.microsoft.com/office/drawing/2010/main" w="9525">
                     <a:solidFill>
                       <a:srgbClr val="000000"/>
                     </a:solidFill>
@@ -10238,7 +10243,7 @@
               </a:ln>
               <a:extLst>
                 <a:ext uri="{91240B29-F687-4f45-9708-019B960494DF}">
-                  <a14:hiddenLine xmlns:a14="http://schemas.microsoft.com/office/drawing/2010/main" xmlns="" w="9525">
+                  <a14:hiddenLine xmlns="" xmlns:a14="http://schemas.microsoft.com/office/drawing/2010/main" w="9525">
                     <a:solidFill>
                       <a:srgbClr val="000000"/>
                     </a:solidFill>
@@ -10272,7 +10277,7 @@
               </a:ln>
               <a:extLst>
                 <a:ext uri="{91240B29-F687-4f45-9708-019B960494DF}">
-                  <a14:hiddenLine xmlns:a14="http://schemas.microsoft.com/office/drawing/2010/main" xmlns="" w="9525">
+                  <a14:hiddenLine xmlns="" xmlns:a14="http://schemas.microsoft.com/office/drawing/2010/main" w="9525">
                     <a:solidFill>
                       <a:srgbClr val="000000"/>
                     </a:solidFill>
@@ -10337,7 +10342,7 @@
               </a:ln>
               <a:extLst>
                 <a:ext uri="{91240B29-F687-4f45-9708-019B960494DF}">
-                  <a14:hiddenLine xmlns:a14="http://schemas.microsoft.com/office/drawing/2010/main" xmlns="" w="9525">
+                  <a14:hiddenLine xmlns="" xmlns:a14="http://schemas.microsoft.com/office/drawing/2010/main" w="9525">
                     <a:solidFill>
                       <a:srgbClr val="000000"/>
                     </a:solidFill>
@@ -10427,7 +10432,7 @@
               </a:ln>
               <a:extLst>
                 <a:ext uri="{91240B29-F687-4f45-9708-019B960494DF}">
-                  <a14:hiddenLine xmlns:a14="http://schemas.microsoft.com/office/drawing/2010/main" xmlns="" w="9525">
+                  <a14:hiddenLine xmlns="" xmlns:a14="http://schemas.microsoft.com/office/drawing/2010/main" w="9525">
                     <a:solidFill>
                       <a:srgbClr val="000000"/>
                     </a:solidFill>
@@ -10489,7 +10494,7 @@
               </a:ln>
               <a:extLst>
                 <a:ext uri="{91240B29-F687-4f45-9708-019B960494DF}">
-                  <a14:hiddenLine xmlns:a14="http://schemas.microsoft.com/office/drawing/2010/main" xmlns="" w="9525">
+                  <a14:hiddenLine xmlns="" xmlns:a14="http://schemas.microsoft.com/office/drawing/2010/main" w="9525">
                     <a:solidFill>
                       <a:srgbClr val="000000"/>
                     </a:solidFill>
@@ -10579,7 +10584,7 @@
               </a:ln>
               <a:extLst>
                 <a:ext uri="{91240B29-F687-4f45-9708-019B960494DF}">
-                  <a14:hiddenLine xmlns:a14="http://schemas.microsoft.com/office/drawing/2010/main" xmlns="" w="9525">
+                  <a14:hiddenLine xmlns="" xmlns:a14="http://schemas.microsoft.com/office/drawing/2010/main" w="9525">
                     <a:solidFill>
                       <a:srgbClr val="000000"/>
                     </a:solidFill>
@@ -10644,7 +10649,7 @@
               </a:ln>
               <a:extLst>
                 <a:ext uri="{91240B29-F687-4f45-9708-019B960494DF}">
-                  <a14:hiddenLine xmlns:a14="http://schemas.microsoft.com/office/drawing/2010/main" xmlns="" w="9525">
+                  <a14:hiddenLine xmlns="" xmlns:a14="http://schemas.microsoft.com/office/drawing/2010/main" w="9525">
                     <a:solidFill>
                       <a:srgbClr val="000000"/>
                     </a:solidFill>
@@ -10706,7 +10711,7 @@
               </a:ln>
               <a:extLst>
                 <a:ext uri="{91240B29-F687-4f45-9708-019B960494DF}">
-                  <a14:hiddenLine xmlns:a14="http://schemas.microsoft.com/office/drawing/2010/main" xmlns="" w="9525">
+                  <a14:hiddenLine xmlns="" xmlns:a14="http://schemas.microsoft.com/office/drawing/2010/main" w="9525">
                     <a:solidFill>
                       <a:srgbClr val="000000"/>
                     </a:solidFill>
@@ -10796,7 +10801,7 @@
               </a:ln>
               <a:extLst>
                 <a:ext uri="{91240B29-F687-4f45-9708-019B960494DF}">
-                  <a14:hiddenLine xmlns:a14="http://schemas.microsoft.com/office/drawing/2010/main" xmlns="" w="9525">
+                  <a14:hiddenLine xmlns="" xmlns:a14="http://schemas.microsoft.com/office/drawing/2010/main" w="9525">
                     <a:solidFill>
                       <a:srgbClr val="000000"/>
                     </a:solidFill>
@@ -10886,7 +10891,7 @@
               </a:ln>
               <a:extLst>
                 <a:ext uri="{91240B29-F687-4f45-9708-019B960494DF}">
-                  <a14:hiddenLine xmlns:a14="http://schemas.microsoft.com/office/drawing/2010/main" xmlns="" w="9525">
+                  <a14:hiddenLine xmlns="" xmlns:a14="http://schemas.microsoft.com/office/drawing/2010/main" w="9525">
                     <a:solidFill>
                       <a:srgbClr val="000000"/>
                     </a:solidFill>
@@ -10951,7 +10956,7 @@
               </a:ln>
               <a:extLst>
                 <a:ext uri="{91240B29-F687-4f45-9708-019B960494DF}">
-                  <a14:hiddenLine xmlns:a14="http://schemas.microsoft.com/office/drawing/2010/main" xmlns="" w="9525">
+                  <a14:hiddenLine xmlns="" xmlns:a14="http://schemas.microsoft.com/office/drawing/2010/main" w="9525">
                     <a:solidFill>
                       <a:srgbClr val="000000"/>
                     </a:solidFill>
@@ -11071,7 +11076,7 @@
               </a:ln>
               <a:extLst>
                 <a:ext uri="{91240B29-F687-4f45-9708-019B960494DF}">
-                  <a14:hiddenLine xmlns:a14="http://schemas.microsoft.com/office/drawing/2010/main" xmlns="" w="9525">
+                  <a14:hiddenLine xmlns="" xmlns:a14="http://schemas.microsoft.com/office/drawing/2010/main" w="9525">
                     <a:solidFill>
                       <a:srgbClr val="000000"/>
                     </a:solidFill>
@@ -11169,7 +11174,7 @@
               </a:ln>
               <a:extLst>
                 <a:ext uri="{91240B29-F687-4f45-9708-019B960494DF}">
-                  <a14:hiddenLine xmlns:a14="http://schemas.microsoft.com/office/drawing/2010/main" xmlns="" w="9525">
+                  <a14:hiddenLine xmlns="" xmlns:a14="http://schemas.microsoft.com/office/drawing/2010/main" w="9525">
                     <a:solidFill>
                       <a:srgbClr val="000000"/>
                     </a:solidFill>
@@ -11284,7 +11289,7 @@
               </a:ln>
               <a:extLst>
                 <a:ext uri="{91240B29-F687-4f45-9708-019B960494DF}">
-                  <a14:hiddenLine xmlns:a14="http://schemas.microsoft.com/office/drawing/2010/main" xmlns="" w="9525">
+                  <a14:hiddenLine xmlns="" xmlns:a14="http://schemas.microsoft.com/office/drawing/2010/main" w="9525">
                     <a:solidFill>
                       <a:srgbClr val="000000"/>
                     </a:solidFill>
@@ -11374,7 +11379,7 @@
               </a:ln>
               <a:extLst>
                 <a:ext uri="{91240B29-F687-4f45-9708-019B960494DF}">
-                  <a14:hiddenLine xmlns:a14="http://schemas.microsoft.com/office/drawing/2010/main" xmlns="" w="9525">
+                  <a14:hiddenLine xmlns="" xmlns:a14="http://schemas.microsoft.com/office/drawing/2010/main" w="9525">
                     <a:solidFill>
                       <a:srgbClr val="000000"/>
                     </a:solidFill>
@@ -11439,7 +11444,7 @@
               </a:ln>
               <a:extLst>
                 <a:ext uri="{91240B29-F687-4f45-9708-019B960494DF}">
-                  <a14:hiddenLine xmlns:a14="http://schemas.microsoft.com/office/drawing/2010/main" xmlns="" w="9525">
+                  <a14:hiddenLine xmlns="" xmlns:a14="http://schemas.microsoft.com/office/drawing/2010/main" w="9525">
                     <a:solidFill>
                       <a:srgbClr val="000000"/>
                     </a:solidFill>
@@ -11529,7 +11534,7 @@
               </a:ln>
               <a:extLst>
                 <a:ext uri="{91240B29-F687-4f45-9708-019B960494DF}">
-                  <a14:hiddenLine xmlns:a14="http://schemas.microsoft.com/office/drawing/2010/main" xmlns="" w="9525">
+                  <a14:hiddenLine xmlns="" xmlns:a14="http://schemas.microsoft.com/office/drawing/2010/main" w="9525">
                     <a:solidFill>
                       <a:srgbClr val="000000"/>
                     </a:solidFill>
@@ -11597,7 +11602,7 @@
               </a:ln>
               <a:extLst>
                 <a:ext uri="{91240B29-F687-4f45-9708-019B960494DF}">
-                  <a14:hiddenLine xmlns:a14="http://schemas.microsoft.com/office/drawing/2010/main" xmlns="" w="9525">
+                  <a14:hiddenLine xmlns="" xmlns:a14="http://schemas.microsoft.com/office/drawing/2010/main" w="9525">
                     <a:solidFill>
                       <a:srgbClr val="000000"/>
                     </a:solidFill>
@@ -11687,7 +11692,7 @@
               </a:ln>
               <a:extLst>
                 <a:ext uri="{91240B29-F687-4f45-9708-019B960494DF}">
-                  <a14:hiddenLine xmlns:a14="http://schemas.microsoft.com/office/drawing/2010/main" xmlns="" w="9525">
+                  <a14:hiddenLine xmlns="" xmlns:a14="http://schemas.microsoft.com/office/drawing/2010/main" w="9525">
                     <a:solidFill>
                       <a:srgbClr val="000000"/>
                     </a:solidFill>
@@ -11755,7 +11760,7 @@
               </a:ln>
               <a:extLst>
                 <a:ext uri="{91240B29-F687-4f45-9708-019B960494DF}">
-                  <a14:hiddenLine xmlns:a14="http://schemas.microsoft.com/office/drawing/2010/main" xmlns="" w="9525">
+                  <a14:hiddenLine xmlns="" xmlns:a14="http://schemas.microsoft.com/office/drawing/2010/main" w="9525">
                     <a:solidFill>
                       <a:srgbClr val="000000"/>
                     </a:solidFill>
@@ -11845,7 +11850,7 @@
               </a:ln>
               <a:extLst>
                 <a:ext uri="{91240B29-F687-4f45-9708-019B960494DF}">
-                  <a14:hiddenLine xmlns:a14="http://schemas.microsoft.com/office/drawing/2010/main" xmlns="" w="9525">
+                  <a14:hiddenLine xmlns="" xmlns:a14="http://schemas.microsoft.com/office/drawing/2010/main" w="9525">
                     <a:solidFill>
                       <a:srgbClr val="000000"/>
                     </a:solidFill>
@@ -11879,7 +11884,7 @@
               </a:ln>
               <a:extLst>
                 <a:ext uri="{91240B29-F687-4f45-9708-019B960494DF}">
-                  <a14:hiddenLine xmlns:a14="http://schemas.microsoft.com/office/drawing/2010/main" xmlns="" w="9525">
+                  <a14:hiddenLine xmlns="" xmlns:a14="http://schemas.microsoft.com/office/drawing/2010/main" w="9525">
                     <a:solidFill>
                       <a:srgbClr val="000000"/>
                     </a:solidFill>
@@ -12019,7 +12024,7 @@
           <a:p>
             <a:fld id="{B6416A5E-5CBD-41E4-8742-691F0FE399C2}" type="datetimeFigureOut">
               <a:rPr lang="en-CA" smtClean="0"/>
-              <a:t>2018-01-23</a:t>
+              <a:t>2018-01-31</a:t>
             </a:fld>
             <a:endParaRPr lang="en-CA"/>
           </a:p>
@@ -12548,8 +12553,16 @@
 </file>
 
 <file path=ppt/slides/slide2.xml><?xml version="1.0" encoding="utf-8"?>
-<p:sld xmlns:a="http://schemas.openxmlformats.org/drawingml/2006/main" xmlns:r="http://schemas.openxmlformats.org/officeDocument/2006/relationships" xmlns:p="http://schemas.openxmlformats.org/presentationml/2006/main">
+<p:sld xmlns:a="http://schemas.openxmlformats.org/drawingml/2006/main" xmlns:r="http://schemas.openxmlformats.org/officeDocument/2006/relationships" xmlns:p="http://schemas.openxmlformats.org/presentationml/2006/main" showMasterSp="0">
   <p:cSld>
+    <p:bg>
+      <p:bgPr>
+        <a:solidFill>
+          <a:schemeClr val="tx1"/>
+        </a:solidFill>
+        <a:effectLst/>
+      </p:bgPr>
+    </p:bg>
     <p:spTree>
       <p:nvGrpSpPr>
         <p:cNvPr id="1" name=""/>
@@ -12580,50 +12593,68 @@
             <p:ph type="title"/>
           </p:nvPr>
         </p:nvSpPr>
-        <p:spPr/>
+        <p:spPr>
+          <a:xfrm>
+            <a:off x="262454" y="0"/>
+            <a:ext cx="9905998" cy="677584"/>
+          </a:xfrm>
+        </p:spPr>
         <p:txBody>
           <a:bodyPr/>
           <a:lstStyle/>
           <a:p>
             <a:r>
-              <a:rPr lang="en-US" altLang="en-US" dirty="0"/>
+              <a:rPr lang="en-US" altLang="en-US" dirty="0">
+                <a:solidFill>
+                  <a:schemeClr val="bg1"/>
+                </a:solidFill>
+              </a:rPr>
               <a:t>Recall, future state VSM</a:t>
             </a:r>
-            <a:endParaRPr lang="en-CA" dirty="0"/>
+            <a:endParaRPr lang="en-CA" dirty="0">
+              <a:solidFill>
+                <a:schemeClr val="bg1"/>
+              </a:solidFill>
+            </a:endParaRPr>
           </a:p>
         </p:txBody>
       </p:sp>
-      <p:sp>
-        <p:nvSpPr>
-          <p:cNvPr id="3" name="Content Placeholder 2">
+      <p:pic>
+        <p:nvPicPr>
+          <p:cNvPr id="9" name="Picture 8">
             <a:extLst>
               <a:ext uri="{FF2B5EF4-FFF2-40B4-BE49-F238E27FC236}">
-                <a16:creationId xmlns:a16="http://schemas.microsoft.com/office/drawing/2014/main" id="{1396EF25-72E9-427E-AF13-D223B84D6ABA}"/>
+                <a16:creationId xmlns:a16="http://schemas.microsoft.com/office/drawing/2014/main" id="{E5BC8E34-03FD-4025-9113-82E0FE1D1D25}"/>
               </a:ext>
             </a:extLst>
           </p:cNvPr>
-          <p:cNvSpPr>
-            <a:spLocks noGrp="1"/>
-          </p:cNvSpPr>
-          <p:nvPr>
-            <p:ph idx="1"/>
-          </p:nvPr>
-        </p:nvSpPr>
-        <p:spPr/>
-        <p:txBody>
-          <a:bodyPr/>
-          <a:lstStyle/>
-          <a:p>
-            <a:r>
-              <a:rPr lang="en-US" altLang="en-US" dirty="0"/>
-              <a:t>Briefly go over your group’s future state VSM</a:t>
-            </a:r>
-          </a:p>
-          <a:p>
-            <a:endParaRPr lang="en-CA" dirty="0"/>
-          </a:p>
-        </p:txBody>
-      </p:sp>
+          <p:cNvPicPr>
+            <a:picLocks noChangeAspect="1"/>
+          </p:cNvPicPr>
+          <p:nvPr/>
+        </p:nvPicPr>
+        <p:blipFill>
+          <a:blip r:embed="rId2">
+            <a:extLst>
+              <a:ext uri="{28A0092B-C50C-407E-A947-70E740481C1C}">
+                <a14:useLocalDpi xmlns:a14="http://schemas.microsoft.com/office/drawing/2010/main" val="0"/>
+              </a:ext>
+            </a:extLst>
+          </a:blip>
+          <a:stretch>
+            <a:fillRect/>
+          </a:stretch>
+        </p:blipFill>
+        <p:spPr>
+          <a:xfrm>
+            <a:off x="0" y="590286"/>
+            <a:ext cx="12192000" cy="6060199"/>
+          </a:xfrm>
+          <a:prstGeom prst="rect">
+            <a:avLst/>
+          </a:prstGeom>
+        </p:spPr>
+      </p:pic>
     </p:spTree>
     <p:extLst>
       <p:ext uri="{BB962C8B-B14F-4D97-AF65-F5344CB8AC3E}">
@@ -12638,130 +12669,6 @@
 </file>
 
 <file path=ppt/slides/slide3.xml><?xml version="1.0" encoding="utf-8"?>
-<p:sld xmlns:a="http://schemas.openxmlformats.org/drawingml/2006/main" xmlns:r="http://schemas.openxmlformats.org/officeDocument/2006/relationships" xmlns:p="http://schemas.openxmlformats.org/presentationml/2006/main">
-  <p:cSld>
-    <p:spTree>
-      <p:nvGrpSpPr>
-        <p:cNvPr id="1" name=""/>
-        <p:cNvGrpSpPr/>
-        <p:nvPr/>
-      </p:nvGrpSpPr>
-      <p:grpSpPr>
-        <a:xfrm>
-          <a:off x="0" y="0"/>
-          <a:ext cx="0" cy="0"/>
-          <a:chOff x="0" y="0"/>
-          <a:chExt cx="0" cy="0"/>
-        </a:xfrm>
-      </p:grpSpPr>
-      <p:sp>
-        <p:nvSpPr>
-          <p:cNvPr id="2" name="Title 1">
-            <a:extLst>
-              <a:ext uri="{FF2B5EF4-FFF2-40B4-BE49-F238E27FC236}">
-                <a16:creationId xmlns:a16="http://schemas.microsoft.com/office/drawing/2014/main" id="{21B8126F-C2B2-40B9-93CE-BD67592FEA92}"/>
-              </a:ext>
-            </a:extLst>
-          </p:cNvPr>
-          <p:cNvSpPr>
-            <a:spLocks noGrp="1"/>
-          </p:cNvSpPr>
-          <p:nvPr>
-            <p:ph type="title"/>
-          </p:nvPr>
-        </p:nvSpPr>
-        <p:spPr/>
-        <p:txBody>
-          <a:bodyPr/>
-          <a:lstStyle/>
-          <a:p>
-            <a:r>
-              <a:rPr lang="en-US" altLang="en-US" dirty="0"/>
-              <a:t>User Story Map</a:t>
-            </a:r>
-            <a:endParaRPr lang="en-CA" dirty="0"/>
-          </a:p>
-        </p:txBody>
-      </p:sp>
-      <p:sp>
-        <p:nvSpPr>
-          <p:cNvPr id="3" name="Content Placeholder 2">
-            <a:extLst>
-              <a:ext uri="{FF2B5EF4-FFF2-40B4-BE49-F238E27FC236}">
-                <a16:creationId xmlns:a16="http://schemas.microsoft.com/office/drawing/2014/main" id="{389C344D-4D95-46F4-A8B9-FE38DCA651C5}"/>
-              </a:ext>
-            </a:extLst>
-          </p:cNvPr>
-          <p:cNvSpPr>
-            <a:spLocks noGrp="1"/>
-          </p:cNvSpPr>
-          <p:nvPr>
-            <p:ph idx="1"/>
-          </p:nvPr>
-        </p:nvSpPr>
-        <p:spPr/>
-        <p:txBody>
-          <a:bodyPr/>
-          <a:lstStyle/>
-          <a:p>
-            <a:r>
-              <a:rPr lang="en-US" altLang="en-US" dirty="0"/>
-              <a:t>Display your completed user story map &amp; discuss it all</a:t>
-            </a:r>
-          </a:p>
-          <a:p>
-            <a:r>
-              <a:rPr lang="en-US" altLang="en-US" dirty="0"/>
-              <a:t>Emphasize the linkages with the future state VSM</a:t>
-            </a:r>
-          </a:p>
-          <a:p>
-            <a:r>
-              <a:rPr lang="en-US" altLang="en-US" dirty="0"/>
-              <a:t>Share any thoughts</a:t>
-            </a:r>
-          </a:p>
-          <a:p>
-            <a:pPr lvl="1"/>
-            <a:r>
-              <a:rPr lang="en-US" altLang="en-US" dirty="0"/>
-              <a:t>Rationale on release slices selected</a:t>
-            </a:r>
-          </a:p>
-          <a:p>
-            <a:pPr lvl="1"/>
-            <a:r>
-              <a:rPr lang="en-US" altLang="en-US" dirty="0"/>
-              <a:t>Any barriers you may envision</a:t>
-            </a:r>
-          </a:p>
-          <a:p>
-            <a:pPr lvl="1"/>
-            <a:r>
-              <a:rPr lang="en-US" altLang="en-US" dirty="0"/>
-              <a:t>Etc.</a:t>
-            </a:r>
-            <a:endParaRPr lang="en-CA" altLang="en-US" dirty="0"/>
-          </a:p>
-          <a:p>
-            <a:endParaRPr lang="en-CA" dirty="0"/>
-          </a:p>
-        </p:txBody>
-      </p:sp>
-    </p:spTree>
-    <p:extLst>
-      <p:ext uri="{BB962C8B-B14F-4D97-AF65-F5344CB8AC3E}">
-        <p14:creationId xmlns:p14="http://schemas.microsoft.com/office/powerpoint/2010/main" val="3580540341"/>
-      </p:ext>
-    </p:extLst>
-  </p:cSld>
-  <p:clrMapOvr>
-    <a:masterClrMapping/>
-  </p:clrMapOvr>
-</p:sld>
-</file>
-
-<file path=ppt/slides/slide4.xml><?xml version="1.0" encoding="utf-8"?>
 <p:sld xmlns:a="http://schemas.openxmlformats.org/drawingml/2006/main" xmlns:r="http://schemas.openxmlformats.org/officeDocument/2006/relationships" xmlns:p="http://schemas.openxmlformats.org/presentationml/2006/main">
   <p:cSld>
     <p:spTree>
@@ -12823,9 +12730,16 @@
             <p:ph idx="1"/>
           </p:nvPr>
         </p:nvSpPr>
-        <p:spPr/>
+        <p:spPr>
+          <a:xfrm>
+            <a:off x="1141412" y="1845449"/>
+            <a:ext cx="9905999" cy="3541714"/>
+          </a:xfrm>
+        </p:spPr>
         <p:txBody>
-          <a:bodyPr/>
+          <a:bodyPr>
+            <a:normAutofit/>
+          </a:bodyPr>
           <a:lstStyle/>
           <a:p>
             <a:r>
@@ -12837,24 +12751,24 @@
             <a:pPr lvl="1"/>
             <a:r>
               <a:rPr lang="en-US" altLang="en-US" dirty="0"/>
-              <a:t>Something you saw another team did was intriguing/inspiring</a:t>
+              <a:t>We changed how we handled the acronyms, we now allow the user to either select from a list of software programs or search for the desired program</a:t>
             </a:r>
           </a:p>
           <a:p>
             <a:pPr lvl="1"/>
             <a:r>
               <a:rPr lang="en-US" altLang="en-US" dirty="0"/>
-              <a:t>Something you didn’t care for in your initial concept of your future VSM</a:t>
+              <a:t>When requesting approval, the request will either automatically be sent any of the approvers for that software or the user can manually select with approver they would like.</a:t>
             </a:r>
           </a:p>
           <a:p>
-            <a:r>
-              <a:rPr lang="en-US" altLang="en-US" dirty="0"/>
-              <a:t>Add other insights if you like but remember, your group’s report-out must be kept within 5 minutes </a:t>
-            </a:r>
-            <a:endParaRPr lang="en-CA" altLang="en-US" dirty="0"/>
-          </a:p>
-          <a:p>
+            <a:pPr lvl="1"/>
+            <a:endParaRPr lang="en-US" altLang="en-US" dirty="0"/>
+          </a:p>
+          <a:p>
+            <a:pPr marL="0" indent="0">
+              <a:buNone/>
+            </a:pPr>
             <a:endParaRPr lang="en-CA" dirty="0"/>
           </a:p>
         </p:txBody>
@@ -12863,6 +12777,119 @@
     <p:extLst>
       <p:ext uri="{BB962C8B-B14F-4D97-AF65-F5344CB8AC3E}">
         <p14:creationId xmlns:p14="http://schemas.microsoft.com/office/powerpoint/2010/main" val="4142412050"/>
+      </p:ext>
+    </p:extLst>
+  </p:cSld>
+  <p:clrMapOvr>
+    <a:masterClrMapping/>
+  </p:clrMapOvr>
+</p:sld>
+</file>
+
+<file path=ppt/slides/slide4.xml><?xml version="1.0" encoding="utf-8"?>
+<p:sld xmlns:a="http://schemas.openxmlformats.org/drawingml/2006/main" xmlns:r="http://schemas.openxmlformats.org/officeDocument/2006/relationships" xmlns:p="http://schemas.openxmlformats.org/presentationml/2006/main" showMasterSp="0">
+  <p:cSld>
+    <p:bg>
+      <p:bgPr>
+        <a:solidFill>
+          <a:schemeClr val="tx1"/>
+        </a:solidFill>
+        <a:effectLst/>
+      </p:bgPr>
+    </p:bg>
+    <p:spTree>
+      <p:nvGrpSpPr>
+        <p:cNvPr id="1" name=""/>
+        <p:cNvGrpSpPr/>
+        <p:nvPr/>
+      </p:nvGrpSpPr>
+      <p:grpSpPr>
+        <a:xfrm>
+          <a:off x="0" y="0"/>
+          <a:ext cx="0" cy="0"/>
+          <a:chOff x="0" y="0"/>
+          <a:chExt cx="0" cy="0"/>
+        </a:xfrm>
+      </p:grpSpPr>
+      <p:sp>
+        <p:nvSpPr>
+          <p:cNvPr id="2" name="Title 1">
+            <a:extLst>
+              <a:ext uri="{FF2B5EF4-FFF2-40B4-BE49-F238E27FC236}">
+                <a16:creationId xmlns:a16="http://schemas.microsoft.com/office/drawing/2014/main" id="{5B46FA4E-7886-441F-B828-8206DDA0861C}"/>
+              </a:ext>
+            </a:extLst>
+          </p:cNvPr>
+          <p:cNvSpPr>
+            <a:spLocks noGrp="1"/>
+          </p:cNvSpPr>
+          <p:nvPr>
+            <p:ph type="title"/>
+          </p:nvPr>
+        </p:nvSpPr>
+        <p:spPr>
+          <a:xfrm>
+            <a:off x="1143001" y="0"/>
+            <a:ext cx="9905998" cy="735361"/>
+          </a:xfrm>
+        </p:spPr>
+        <p:txBody>
+          <a:bodyPr>
+            <a:normAutofit/>
+          </a:bodyPr>
+          <a:lstStyle/>
+          <a:p>
+            <a:r>
+              <a:rPr lang="en-CA" dirty="0">
+                <a:solidFill>
+                  <a:schemeClr val="bg1"/>
+                </a:solidFill>
+              </a:rPr>
+              <a:t>User Story Map</a:t>
+            </a:r>
+          </a:p>
+        </p:txBody>
+      </p:sp>
+      <p:pic>
+        <p:nvPicPr>
+          <p:cNvPr id="8" name="Picture 7">
+            <a:extLst>
+              <a:ext uri="{FF2B5EF4-FFF2-40B4-BE49-F238E27FC236}">
+                <a16:creationId xmlns:a16="http://schemas.microsoft.com/office/drawing/2014/main" id="{84F8797C-6112-4BFC-8814-056F8152F9F8}"/>
+              </a:ext>
+            </a:extLst>
+          </p:cNvPr>
+          <p:cNvPicPr>
+            <a:picLocks noChangeAspect="1"/>
+          </p:cNvPicPr>
+          <p:nvPr/>
+        </p:nvPicPr>
+        <p:blipFill>
+          <a:blip r:embed="rId2">
+            <a:extLst>
+              <a:ext uri="{28A0092B-C50C-407E-A947-70E740481C1C}">
+                <a14:useLocalDpi xmlns:a14="http://schemas.microsoft.com/office/drawing/2010/main" val="0"/>
+              </a:ext>
+            </a:extLst>
+          </a:blip>
+          <a:stretch>
+            <a:fillRect/>
+          </a:stretch>
+        </p:blipFill>
+        <p:spPr>
+          <a:xfrm>
+            <a:off x="485553" y="589740"/>
+            <a:ext cx="11220893" cy="6268260"/>
+          </a:xfrm>
+          <a:prstGeom prst="rect">
+            <a:avLst/>
+          </a:prstGeom>
+        </p:spPr>
+      </p:pic>
+    </p:spTree>
+    <p:extLst>
+      <p:ext uri="{BB962C8B-B14F-4D97-AF65-F5344CB8AC3E}">
+        <p14:creationId xmlns:p14="http://schemas.microsoft.com/office/powerpoint/2010/main" val="569357796"/>
       </p:ext>
     </p:extLst>
   </p:cSld>
@@ -12905,7 +12932,12 @@
             <p:ph type="title"/>
           </p:nvPr>
         </p:nvSpPr>
-        <p:spPr/>
+        <p:spPr>
+          <a:xfrm>
+            <a:off x="1141412" y="575228"/>
+            <a:ext cx="9905998" cy="849535"/>
+          </a:xfrm>
+        </p:spPr>
         <p:txBody>
           <a:bodyPr/>
           <a:lstStyle/>
@@ -12934,10 +12966,15 @@
             <p:ph idx="1"/>
           </p:nvPr>
         </p:nvSpPr>
-        <p:spPr/>
+        <p:spPr>
+          <a:xfrm>
+            <a:off x="1141412" y="1424763"/>
+            <a:ext cx="9905999" cy="5266660"/>
+          </a:xfrm>
+        </p:spPr>
         <p:txBody>
           <a:bodyPr>
-            <a:normAutofit fontScale="85000" lnSpcReduction="10000"/>
+            <a:normAutofit fontScale="92500" lnSpcReduction="10000"/>
           </a:bodyPr>
           <a:lstStyle/>
           <a:p>
@@ -12955,7 +12992,7 @@
             </a:pPr>
             <a:r>
               <a:rPr lang="en-US" dirty="0"/>
-              <a:t>[Response here]</a:t>
+              <a:t>Its interesting creating a road map to follow when developing software</a:t>
             </a:r>
           </a:p>
           <a:p>
@@ -12973,7 +13010,16 @@
             </a:pPr>
             <a:r>
               <a:rPr lang="en-US" dirty="0"/>
-              <a:t>[Response here]</a:t>
+              <a:t>We learned how to take the ideas that we generated from our future state diagram and incorporate them into our user story map.</a:t>
+            </a:r>
+          </a:p>
+          <a:p>
+            <a:pPr lvl="1">
+              <a:defRPr/>
+            </a:pPr>
+            <a:r>
+              <a:rPr lang="en-US" dirty="0"/>
+              <a:t>How to breakdown and determine the order of our activities as well determining the priority of our functionality</a:t>
             </a:r>
           </a:p>
           <a:p>
@@ -12991,7 +13037,7 @@
             </a:pPr>
             <a:r>
               <a:rPr lang="en-US" dirty="0"/>
-              <a:t>[Response here]</a:t>
+              <a:t>We will use the user story map that we created to develop milestone 4.</a:t>
             </a:r>
           </a:p>
           <a:p>
@@ -13009,7 +13055,7 @@
             </a:pPr>
             <a:r>
               <a:rPr lang="en-US" dirty="0"/>
-              <a:t>[Response here]</a:t>
+              <a:t>It was a bit challenging breaking our ideas down for our user map.</a:t>
             </a:r>
             <a:endParaRPr lang="en-CA" dirty="0"/>
           </a:p>

</xml_diff>

<commit_message>
Update: corrected missed word
</commit_message>
<xml_diff>
--- a/Milestone 3/ENSE 470 Milestone 3.pptx
+++ b/Milestone 3/ENSE 470 Milestone 3.pptx
@@ -170,7 +170,7 @@
           <a:noFill/>
           <a:extLst>
             <a:ext uri="{909E8E84-426E-40dd-AFC4-6F175D3DCCD1}">
-              <a14:hiddenFill xmlns="" xmlns:a14="http://schemas.microsoft.com/office/drawing/2010/main">
+              <a14:hiddenFill xmlns:a14="http://schemas.microsoft.com/office/drawing/2010/main" xmlns="">
                 <a:solidFill>
                   <a:srgbClr val="FFFFFF"/>
                 </a:solidFill>
@@ -230,7 +230,7 @@
             </a:ln>
             <a:extLst>
               <a:ext uri="{91240B29-F687-4f45-9708-019B960494DF}">
-                <a14:hiddenLine xmlns="" xmlns:a14="http://schemas.microsoft.com/office/drawing/2010/main" w="9525">
+                <a14:hiddenLine xmlns:a14="http://schemas.microsoft.com/office/drawing/2010/main" xmlns="" w="9525">
                   <a:solidFill>
                     <a:srgbClr val="000000"/>
                   </a:solidFill>
@@ -320,7 +320,7 @@
             </a:ln>
             <a:extLst>
               <a:ext uri="{91240B29-F687-4f45-9708-019B960494DF}">
-                <a14:hiddenLine xmlns="" xmlns:a14="http://schemas.microsoft.com/office/drawing/2010/main" w="9525">
+                <a14:hiddenLine xmlns:a14="http://schemas.microsoft.com/office/drawing/2010/main" xmlns="" w="9525">
                   <a:solidFill>
                     <a:srgbClr val="000000"/>
                   </a:solidFill>
@@ -410,7 +410,7 @@
             </a:ln>
             <a:extLst>
               <a:ext uri="{91240B29-F687-4f45-9708-019B960494DF}">
-                <a14:hiddenLine xmlns="" xmlns:a14="http://schemas.microsoft.com/office/drawing/2010/main" w="9525">
+                <a14:hiddenLine xmlns:a14="http://schemas.microsoft.com/office/drawing/2010/main" xmlns="" w="9525">
                   <a:solidFill>
                     <a:srgbClr val="000000"/>
                   </a:solidFill>
@@ -444,7 +444,7 @@
             </a:ln>
             <a:extLst>
               <a:ext uri="{91240B29-F687-4f45-9708-019B960494DF}">
-                <a14:hiddenLine xmlns="" xmlns:a14="http://schemas.microsoft.com/office/drawing/2010/main" w="9525">
+                <a14:hiddenLine xmlns:a14="http://schemas.microsoft.com/office/drawing/2010/main" xmlns="" w="9525">
                   <a:solidFill>
                     <a:srgbClr val="000000"/>
                   </a:solidFill>
@@ -534,7 +534,7 @@
             </a:ln>
             <a:extLst>
               <a:ext uri="{91240B29-F687-4f45-9708-019B960494DF}">
-                <a14:hiddenLine xmlns="" xmlns:a14="http://schemas.microsoft.com/office/drawing/2010/main" w="9525">
+                <a14:hiddenLine xmlns:a14="http://schemas.microsoft.com/office/drawing/2010/main" xmlns="" w="9525">
                   <a:solidFill>
                     <a:srgbClr val="000000"/>
                   </a:solidFill>
@@ -596,7 +596,7 @@
             </a:ln>
             <a:extLst>
               <a:ext uri="{91240B29-F687-4f45-9708-019B960494DF}">
-                <a14:hiddenLine xmlns="" xmlns:a14="http://schemas.microsoft.com/office/drawing/2010/main" w="9525">
+                <a14:hiddenLine xmlns:a14="http://schemas.microsoft.com/office/drawing/2010/main" xmlns="" w="9525">
                   <a:solidFill>
                     <a:srgbClr val="000000"/>
                   </a:solidFill>
@@ -658,7 +658,7 @@
             </a:ln>
             <a:extLst>
               <a:ext uri="{91240B29-F687-4f45-9708-019B960494DF}">
-                <a14:hiddenLine xmlns="" xmlns:a14="http://schemas.microsoft.com/office/drawing/2010/main" w="9525">
+                <a14:hiddenLine xmlns:a14="http://schemas.microsoft.com/office/drawing/2010/main" xmlns="" w="9525">
                   <a:solidFill>
                     <a:srgbClr val="000000"/>
                   </a:solidFill>
@@ -748,7 +748,7 @@
             </a:ln>
             <a:extLst>
               <a:ext uri="{91240B29-F687-4f45-9708-019B960494DF}">
-                <a14:hiddenLine xmlns="" xmlns:a14="http://schemas.microsoft.com/office/drawing/2010/main" w="9525">
+                <a14:hiddenLine xmlns:a14="http://schemas.microsoft.com/office/drawing/2010/main" xmlns="" w="9525">
                   <a:solidFill>
                     <a:srgbClr val="000000"/>
                   </a:solidFill>
@@ -810,7 +810,7 @@
             </a:ln>
             <a:extLst>
               <a:ext uri="{91240B29-F687-4f45-9708-019B960494DF}">
-                <a14:hiddenLine xmlns="" xmlns:a14="http://schemas.microsoft.com/office/drawing/2010/main" w="9525">
+                <a14:hiddenLine xmlns:a14="http://schemas.microsoft.com/office/drawing/2010/main" xmlns="" w="9525">
                   <a:solidFill>
                     <a:srgbClr val="000000"/>
                   </a:solidFill>
@@ -872,7 +872,7 @@
             </a:ln>
             <a:extLst>
               <a:ext uri="{91240B29-F687-4f45-9708-019B960494DF}">
-                <a14:hiddenLine xmlns="" xmlns:a14="http://schemas.microsoft.com/office/drawing/2010/main" w="9525">
+                <a14:hiddenLine xmlns:a14="http://schemas.microsoft.com/office/drawing/2010/main" xmlns="" w="9525">
                   <a:solidFill>
                     <a:srgbClr val="000000"/>
                   </a:solidFill>
@@ -962,7 +962,7 @@
             </a:ln>
             <a:extLst>
               <a:ext uri="{91240B29-F687-4f45-9708-019B960494DF}">
-                <a14:hiddenLine xmlns="" xmlns:a14="http://schemas.microsoft.com/office/drawing/2010/main" w="9525">
+                <a14:hiddenLine xmlns:a14="http://schemas.microsoft.com/office/drawing/2010/main" xmlns="" w="9525">
                   <a:solidFill>
                     <a:srgbClr val="000000"/>
                   </a:solidFill>
@@ -1052,7 +1052,7 @@
             </a:ln>
             <a:extLst>
               <a:ext uri="{91240B29-F687-4f45-9708-019B960494DF}">
-                <a14:hiddenLine xmlns="" xmlns:a14="http://schemas.microsoft.com/office/drawing/2010/main" w="9525">
+                <a14:hiddenLine xmlns:a14="http://schemas.microsoft.com/office/drawing/2010/main" xmlns="" w="9525">
                   <a:solidFill>
                     <a:srgbClr val="000000"/>
                   </a:solidFill>
@@ -1114,7 +1114,7 @@
             </a:ln>
             <a:extLst>
               <a:ext uri="{91240B29-F687-4f45-9708-019B960494DF}">
-                <a14:hiddenLine xmlns="" xmlns:a14="http://schemas.microsoft.com/office/drawing/2010/main" w="9525">
+                <a14:hiddenLine xmlns:a14="http://schemas.microsoft.com/office/drawing/2010/main" xmlns="" w="9525">
                   <a:solidFill>
                     <a:srgbClr val="000000"/>
                   </a:solidFill>
@@ -1224,7 +1224,7 @@
             </a:ln>
             <a:extLst>
               <a:ext uri="{91240B29-F687-4f45-9708-019B960494DF}">
-                <a14:hiddenLine xmlns="" xmlns:a14="http://schemas.microsoft.com/office/drawing/2010/main" w="9525">
+                <a14:hiddenLine xmlns:a14="http://schemas.microsoft.com/office/drawing/2010/main" xmlns="" w="9525">
                   <a:solidFill>
                     <a:srgbClr val="000000"/>
                   </a:solidFill>
@@ -1286,7 +1286,7 @@
             </a:ln>
             <a:extLst>
               <a:ext uri="{91240B29-F687-4f45-9708-019B960494DF}">
-                <a14:hiddenLine xmlns="" xmlns:a14="http://schemas.microsoft.com/office/drawing/2010/main" w="9525">
+                <a14:hiddenLine xmlns:a14="http://schemas.microsoft.com/office/drawing/2010/main" xmlns="" w="9525">
                   <a:solidFill>
                     <a:srgbClr val="000000"/>
                   </a:solidFill>
@@ -1376,7 +1376,7 @@
             </a:ln>
             <a:extLst>
               <a:ext uri="{91240B29-F687-4f45-9708-019B960494DF}">
-                <a14:hiddenLine xmlns="" xmlns:a14="http://schemas.microsoft.com/office/drawing/2010/main" w="9525">
+                <a14:hiddenLine xmlns:a14="http://schemas.microsoft.com/office/drawing/2010/main" xmlns="" w="9525">
                   <a:solidFill>
                     <a:srgbClr val="000000"/>
                   </a:solidFill>
@@ -1466,7 +1466,7 @@
             </a:ln>
             <a:extLst>
               <a:ext uri="{91240B29-F687-4f45-9708-019B960494DF}">
-                <a14:hiddenLine xmlns="" xmlns:a14="http://schemas.microsoft.com/office/drawing/2010/main" w="9525">
+                <a14:hiddenLine xmlns:a14="http://schemas.microsoft.com/office/drawing/2010/main" xmlns="" w="9525">
                   <a:solidFill>
                     <a:srgbClr val="000000"/>
                   </a:solidFill>
@@ -1528,7 +1528,7 @@
             </a:ln>
             <a:extLst>
               <a:ext uri="{91240B29-F687-4f45-9708-019B960494DF}">
-                <a14:hiddenLine xmlns="" xmlns:a14="http://schemas.microsoft.com/office/drawing/2010/main" w="9525">
+                <a14:hiddenLine xmlns:a14="http://schemas.microsoft.com/office/drawing/2010/main" xmlns="" w="9525">
                   <a:solidFill>
                     <a:srgbClr val="000000"/>
                   </a:solidFill>
@@ -1618,7 +1618,7 @@
             </a:ln>
             <a:extLst>
               <a:ext uri="{91240B29-F687-4f45-9708-019B960494DF}">
-                <a14:hiddenLine xmlns="" xmlns:a14="http://schemas.microsoft.com/office/drawing/2010/main" w="9525">
+                <a14:hiddenLine xmlns:a14="http://schemas.microsoft.com/office/drawing/2010/main" xmlns="" w="9525">
                   <a:solidFill>
                     <a:srgbClr val="000000"/>
                   </a:solidFill>
@@ -1708,7 +1708,7 @@
             </a:ln>
             <a:extLst>
               <a:ext uri="{91240B29-F687-4f45-9708-019B960494DF}">
-                <a14:hiddenLine xmlns="" xmlns:a14="http://schemas.microsoft.com/office/drawing/2010/main" w="9525">
+                <a14:hiddenLine xmlns:a14="http://schemas.microsoft.com/office/drawing/2010/main" xmlns="" w="9525">
                   <a:solidFill>
                     <a:srgbClr val="000000"/>
                   </a:solidFill>
@@ -1764,7 +1764,7 @@
             </a:ln>
             <a:extLst>
               <a:ext uri="{91240B29-F687-4f45-9708-019B960494DF}">
-                <a14:hiddenLine xmlns="" xmlns:a14="http://schemas.microsoft.com/office/drawing/2010/main" w="9525">
+                <a14:hiddenLine xmlns:a14="http://schemas.microsoft.com/office/drawing/2010/main" xmlns="" w="9525">
                   <a:solidFill>
                     <a:srgbClr val="000000"/>
                   </a:solidFill>
@@ -1854,7 +1854,7 @@
             </a:ln>
             <a:extLst>
               <a:ext uri="{91240B29-F687-4f45-9708-019B960494DF}">
-                <a14:hiddenLine xmlns="" xmlns:a14="http://schemas.microsoft.com/office/drawing/2010/main" w="9525">
+                <a14:hiddenLine xmlns:a14="http://schemas.microsoft.com/office/drawing/2010/main" xmlns="" w="9525">
                   <a:solidFill>
                     <a:srgbClr val="000000"/>
                   </a:solidFill>
@@ -1910,7 +1910,7 @@
             </a:ln>
             <a:extLst>
               <a:ext uri="{91240B29-F687-4f45-9708-019B960494DF}">
-                <a14:hiddenLine xmlns="" xmlns:a14="http://schemas.microsoft.com/office/drawing/2010/main" w="9525">
+                <a14:hiddenLine xmlns:a14="http://schemas.microsoft.com/office/drawing/2010/main" xmlns="" w="9525">
                   <a:solidFill>
                     <a:srgbClr val="000000"/>
                   </a:solidFill>
@@ -2000,7 +2000,7 @@
             </a:ln>
             <a:extLst>
               <a:ext uri="{91240B29-F687-4f45-9708-019B960494DF}">
-                <a14:hiddenLine xmlns="" xmlns:a14="http://schemas.microsoft.com/office/drawing/2010/main" w="9525">
+                <a14:hiddenLine xmlns:a14="http://schemas.microsoft.com/office/drawing/2010/main" xmlns="" w="9525">
                   <a:solidFill>
                     <a:srgbClr val="000000"/>
                   </a:solidFill>
@@ -2068,7 +2068,7 @@
             </a:ln>
             <a:extLst>
               <a:ext uri="{91240B29-F687-4f45-9708-019B960494DF}">
-                <a14:hiddenLine xmlns="" xmlns:a14="http://schemas.microsoft.com/office/drawing/2010/main" w="9525">
+                <a14:hiddenLine xmlns:a14="http://schemas.microsoft.com/office/drawing/2010/main" xmlns="" w="9525">
                   <a:solidFill>
                     <a:srgbClr val="000000"/>
                   </a:solidFill>
@@ -2158,7 +2158,7 @@
             </a:ln>
             <a:extLst>
               <a:ext uri="{91240B29-F687-4f45-9708-019B960494DF}">
-                <a14:hiddenLine xmlns="" xmlns:a14="http://schemas.microsoft.com/office/drawing/2010/main" w="9525">
+                <a14:hiddenLine xmlns:a14="http://schemas.microsoft.com/office/drawing/2010/main" xmlns="" w="9525">
                   <a:solidFill>
                     <a:srgbClr val="000000"/>
                   </a:solidFill>
@@ -2226,7 +2226,7 @@
             </a:ln>
             <a:extLst>
               <a:ext uri="{91240B29-F687-4f45-9708-019B960494DF}">
-                <a14:hiddenLine xmlns="" xmlns:a14="http://schemas.microsoft.com/office/drawing/2010/main" w="9525">
+                <a14:hiddenLine xmlns:a14="http://schemas.microsoft.com/office/drawing/2010/main" xmlns="" w="9525">
                   <a:solidFill>
                     <a:srgbClr val="000000"/>
                   </a:solidFill>
@@ -2316,7 +2316,7 @@
             </a:ln>
             <a:extLst>
               <a:ext uri="{91240B29-F687-4f45-9708-019B960494DF}">
-                <a14:hiddenLine xmlns="" xmlns:a14="http://schemas.microsoft.com/office/drawing/2010/main" w="9525">
+                <a14:hiddenLine xmlns:a14="http://schemas.microsoft.com/office/drawing/2010/main" xmlns="" w="9525">
                   <a:solidFill>
                     <a:srgbClr val="000000"/>
                   </a:solidFill>
@@ -2350,7 +2350,7 @@
             </a:ln>
             <a:extLst>
               <a:ext uri="{91240B29-F687-4f45-9708-019B960494DF}">
-                <a14:hiddenLine xmlns="" xmlns:a14="http://schemas.microsoft.com/office/drawing/2010/main" w="9525">
+                <a14:hiddenLine xmlns:a14="http://schemas.microsoft.com/office/drawing/2010/main" xmlns="" w="9525">
                   <a:solidFill>
                     <a:srgbClr val="000000"/>
                   </a:solidFill>
@@ -2440,7 +2440,7 @@
             </a:ln>
             <a:extLst>
               <a:ext uri="{91240B29-F687-4f45-9708-019B960494DF}">
-                <a14:hiddenLine xmlns="" xmlns:a14="http://schemas.microsoft.com/office/drawing/2010/main" w="9525">
+                <a14:hiddenLine xmlns:a14="http://schemas.microsoft.com/office/drawing/2010/main" xmlns="" w="9525">
                   <a:solidFill>
                     <a:srgbClr val="000000"/>
                   </a:solidFill>
@@ -2502,7 +2502,7 @@
             </a:ln>
             <a:extLst>
               <a:ext uri="{91240B29-F687-4f45-9708-019B960494DF}">
-                <a14:hiddenLine xmlns="" xmlns:a14="http://schemas.microsoft.com/office/drawing/2010/main" w="9525">
+                <a14:hiddenLine xmlns:a14="http://schemas.microsoft.com/office/drawing/2010/main" xmlns="" w="9525">
                   <a:solidFill>
                     <a:srgbClr val="000000"/>
                   </a:solidFill>
@@ -2564,7 +2564,7 @@
             </a:ln>
             <a:extLst>
               <a:ext uri="{91240B29-F687-4f45-9708-019B960494DF}">
-                <a14:hiddenLine xmlns="" xmlns:a14="http://schemas.microsoft.com/office/drawing/2010/main" w="9525">
+                <a14:hiddenLine xmlns:a14="http://schemas.microsoft.com/office/drawing/2010/main" xmlns="" w="9525">
                   <a:solidFill>
                     <a:srgbClr val="000000"/>
                   </a:solidFill>
@@ -2654,7 +2654,7 @@
             </a:ln>
             <a:extLst>
               <a:ext uri="{91240B29-F687-4f45-9708-019B960494DF}">
-                <a14:hiddenLine xmlns="" xmlns:a14="http://schemas.microsoft.com/office/drawing/2010/main" w="9525">
+                <a14:hiddenLine xmlns:a14="http://schemas.microsoft.com/office/drawing/2010/main" xmlns="" w="9525">
                   <a:solidFill>
                     <a:srgbClr val="000000"/>
                   </a:solidFill>
@@ -2722,7 +2722,7 @@
             </a:ln>
             <a:extLst>
               <a:ext uri="{91240B29-F687-4f45-9708-019B960494DF}">
-                <a14:hiddenLine xmlns="" xmlns:a14="http://schemas.microsoft.com/office/drawing/2010/main" w="9525">
+                <a14:hiddenLine xmlns:a14="http://schemas.microsoft.com/office/drawing/2010/main" xmlns="" w="9525">
                   <a:solidFill>
                     <a:srgbClr val="000000"/>
                   </a:solidFill>
@@ -2784,7 +2784,7 @@
             </a:ln>
             <a:extLst>
               <a:ext uri="{91240B29-F687-4f45-9708-019B960494DF}">
-                <a14:hiddenLine xmlns="" xmlns:a14="http://schemas.microsoft.com/office/drawing/2010/main" w="9525">
+                <a14:hiddenLine xmlns:a14="http://schemas.microsoft.com/office/drawing/2010/main" xmlns="" w="9525">
                   <a:solidFill>
                     <a:srgbClr val="000000"/>
                   </a:solidFill>
@@ -2874,7 +2874,7 @@
             </a:ln>
             <a:extLst>
               <a:ext uri="{91240B29-F687-4f45-9708-019B960494DF}">
-                <a14:hiddenLine xmlns="" xmlns:a14="http://schemas.microsoft.com/office/drawing/2010/main" w="9525">
+                <a14:hiddenLine xmlns:a14="http://schemas.microsoft.com/office/drawing/2010/main" xmlns="" w="9525">
                   <a:solidFill>
                     <a:srgbClr val="000000"/>
                   </a:solidFill>
@@ -2936,7 +2936,7 @@
             </a:ln>
             <a:extLst>
               <a:ext uri="{91240B29-F687-4f45-9708-019B960494DF}">
-                <a14:hiddenLine xmlns="" xmlns:a14="http://schemas.microsoft.com/office/drawing/2010/main" w="9525">
+                <a14:hiddenLine xmlns:a14="http://schemas.microsoft.com/office/drawing/2010/main" xmlns="" w="9525">
                   <a:solidFill>
                     <a:srgbClr val="000000"/>
                   </a:solidFill>
@@ -3026,7 +3026,7 @@
             </a:ln>
             <a:extLst>
               <a:ext uri="{91240B29-F687-4f45-9708-019B960494DF}">
-                <a14:hiddenLine xmlns="" xmlns:a14="http://schemas.microsoft.com/office/drawing/2010/main" w="9525">
+                <a14:hiddenLine xmlns:a14="http://schemas.microsoft.com/office/drawing/2010/main" xmlns="" w="9525">
                   <a:solidFill>
                     <a:srgbClr val="000000"/>
                   </a:solidFill>
@@ -3088,7 +3088,7 @@
             </a:ln>
             <a:extLst>
               <a:ext uri="{91240B29-F687-4f45-9708-019B960494DF}">
-                <a14:hiddenLine xmlns="" xmlns:a14="http://schemas.microsoft.com/office/drawing/2010/main" w="9525">
+                <a14:hiddenLine xmlns:a14="http://schemas.microsoft.com/office/drawing/2010/main" xmlns="" w="9525">
                   <a:solidFill>
                     <a:srgbClr val="000000"/>
                   </a:solidFill>
@@ -3178,7 +3178,7 @@
             </a:ln>
             <a:extLst>
               <a:ext uri="{91240B29-F687-4f45-9708-019B960494DF}">
-                <a14:hiddenLine xmlns="" xmlns:a14="http://schemas.microsoft.com/office/drawing/2010/main" w="9525">
+                <a14:hiddenLine xmlns:a14="http://schemas.microsoft.com/office/drawing/2010/main" xmlns="" w="9525">
                   <a:solidFill>
                     <a:srgbClr val="000000"/>
                   </a:solidFill>
@@ -3212,7 +3212,7 @@
             </a:ln>
             <a:extLst>
               <a:ext uri="{91240B29-F687-4f45-9708-019B960494DF}">
-                <a14:hiddenLine xmlns="" xmlns:a14="http://schemas.microsoft.com/office/drawing/2010/main" w="9525">
+                <a14:hiddenLine xmlns:a14="http://schemas.microsoft.com/office/drawing/2010/main" xmlns="" w="9525">
                   <a:solidFill>
                     <a:srgbClr val="000000"/>
                   </a:solidFill>
@@ -3277,7 +3277,7 @@
             </a:ln>
             <a:extLst>
               <a:ext uri="{91240B29-F687-4f45-9708-019B960494DF}">
-                <a14:hiddenLine xmlns="" xmlns:a14="http://schemas.microsoft.com/office/drawing/2010/main" w="9525">
+                <a14:hiddenLine xmlns:a14="http://schemas.microsoft.com/office/drawing/2010/main" xmlns="" w="9525">
                   <a:solidFill>
                     <a:srgbClr val="000000"/>
                   </a:solidFill>
@@ -3367,7 +3367,7 @@
             </a:ln>
             <a:extLst>
               <a:ext uri="{91240B29-F687-4f45-9708-019B960494DF}">
-                <a14:hiddenLine xmlns="" xmlns:a14="http://schemas.microsoft.com/office/drawing/2010/main" w="9525">
+                <a14:hiddenLine xmlns:a14="http://schemas.microsoft.com/office/drawing/2010/main" xmlns="" w="9525">
                   <a:solidFill>
                     <a:srgbClr val="000000"/>
                   </a:solidFill>
@@ -3429,7 +3429,7 @@
             </a:ln>
             <a:extLst>
               <a:ext uri="{91240B29-F687-4f45-9708-019B960494DF}">
-                <a14:hiddenLine xmlns="" xmlns:a14="http://schemas.microsoft.com/office/drawing/2010/main" w="9525">
+                <a14:hiddenLine xmlns:a14="http://schemas.microsoft.com/office/drawing/2010/main" xmlns="" w="9525">
                   <a:solidFill>
                     <a:srgbClr val="000000"/>
                   </a:solidFill>
@@ -3519,7 +3519,7 @@
             </a:ln>
             <a:extLst>
               <a:ext uri="{91240B29-F687-4f45-9708-019B960494DF}">
-                <a14:hiddenLine xmlns="" xmlns:a14="http://schemas.microsoft.com/office/drawing/2010/main" w="9525">
+                <a14:hiddenLine xmlns:a14="http://schemas.microsoft.com/office/drawing/2010/main" xmlns="" w="9525">
                   <a:solidFill>
                     <a:srgbClr val="000000"/>
                   </a:solidFill>
@@ -3609,7 +3609,7 @@
             </a:ln>
             <a:extLst>
               <a:ext uri="{91240B29-F687-4f45-9708-019B960494DF}">
-                <a14:hiddenLine xmlns="" xmlns:a14="http://schemas.microsoft.com/office/drawing/2010/main" w="9525">
+                <a14:hiddenLine xmlns:a14="http://schemas.microsoft.com/office/drawing/2010/main" xmlns="" w="9525">
                   <a:solidFill>
                     <a:srgbClr val="000000"/>
                   </a:solidFill>
@@ -3674,7 +3674,7 @@
             </a:ln>
             <a:extLst>
               <a:ext uri="{91240B29-F687-4f45-9708-019B960494DF}">
-                <a14:hiddenLine xmlns="" xmlns:a14="http://schemas.microsoft.com/office/drawing/2010/main" w="9525">
+                <a14:hiddenLine xmlns:a14="http://schemas.microsoft.com/office/drawing/2010/main" xmlns="" w="9525">
                   <a:solidFill>
                     <a:srgbClr val="000000"/>
                   </a:solidFill>
@@ -3736,7 +3736,7 @@
             </a:ln>
             <a:extLst>
               <a:ext uri="{91240B29-F687-4f45-9708-019B960494DF}">
-                <a14:hiddenLine xmlns="" xmlns:a14="http://schemas.microsoft.com/office/drawing/2010/main" w="9525">
+                <a14:hiddenLine xmlns:a14="http://schemas.microsoft.com/office/drawing/2010/main" xmlns="" w="9525">
                   <a:solidFill>
                     <a:srgbClr val="000000"/>
                   </a:solidFill>
@@ -3826,7 +3826,7 @@
             </a:ln>
             <a:extLst>
               <a:ext uri="{91240B29-F687-4f45-9708-019B960494DF}">
-                <a14:hiddenLine xmlns="" xmlns:a14="http://schemas.microsoft.com/office/drawing/2010/main" w="9525">
+                <a14:hiddenLine xmlns:a14="http://schemas.microsoft.com/office/drawing/2010/main" xmlns="" w="9525">
                   <a:solidFill>
                     <a:srgbClr val="000000"/>
                   </a:solidFill>
@@ -3916,7 +3916,7 @@
             </a:ln>
             <a:extLst>
               <a:ext uri="{91240B29-F687-4f45-9708-019B960494DF}">
-                <a14:hiddenLine xmlns="" xmlns:a14="http://schemas.microsoft.com/office/drawing/2010/main" w="9525">
+                <a14:hiddenLine xmlns:a14="http://schemas.microsoft.com/office/drawing/2010/main" xmlns="" w="9525">
                   <a:solidFill>
                     <a:srgbClr val="000000"/>
                   </a:solidFill>
@@ -3978,7 +3978,7 @@
             </a:ln>
             <a:extLst>
               <a:ext uri="{91240B29-F687-4f45-9708-019B960494DF}">
-                <a14:hiddenLine xmlns="" xmlns:a14="http://schemas.microsoft.com/office/drawing/2010/main" w="9525">
+                <a14:hiddenLine xmlns:a14="http://schemas.microsoft.com/office/drawing/2010/main" xmlns="" w="9525">
                   <a:solidFill>
                     <a:srgbClr val="000000"/>
                   </a:solidFill>
@@ -4098,7 +4098,7 @@
             </a:ln>
             <a:extLst>
               <a:ext uri="{91240B29-F687-4f45-9708-019B960494DF}">
-                <a14:hiddenLine xmlns="" xmlns:a14="http://schemas.microsoft.com/office/drawing/2010/main" w="9525">
+                <a14:hiddenLine xmlns:a14="http://schemas.microsoft.com/office/drawing/2010/main" xmlns="" w="9525">
                   <a:solidFill>
                     <a:srgbClr val="000000"/>
                   </a:solidFill>
@@ -4166,7 +4166,7 @@
             </a:ln>
             <a:extLst>
               <a:ext uri="{91240B29-F687-4f45-9708-019B960494DF}">
-                <a14:hiddenLine xmlns="" xmlns:a14="http://schemas.microsoft.com/office/drawing/2010/main" w="9525">
+                <a14:hiddenLine xmlns:a14="http://schemas.microsoft.com/office/drawing/2010/main" xmlns="" w="9525">
                   <a:solidFill>
                     <a:srgbClr val="000000"/>
                   </a:solidFill>
@@ -4256,7 +4256,7 @@
             </a:ln>
             <a:extLst>
               <a:ext uri="{91240B29-F687-4f45-9708-019B960494DF}">
-                <a14:hiddenLine xmlns="" xmlns:a14="http://schemas.microsoft.com/office/drawing/2010/main" w="9525">
+                <a14:hiddenLine xmlns:a14="http://schemas.microsoft.com/office/drawing/2010/main" xmlns="" w="9525">
                   <a:solidFill>
                     <a:srgbClr val="000000"/>
                   </a:solidFill>
@@ -4396,7 +4396,7 @@
           <a:p>
             <a:fld id="{B6416A5E-5CBD-41E4-8742-691F0FE399C2}" type="datetimeFigureOut">
               <a:rPr lang="en-CA" smtClean="0"/>
-              <a:t>2018-01-31</a:t>
+              <a:t>2018-02-01</a:t>
             </a:fld>
             <a:endParaRPr lang="en-CA"/>
           </a:p>
@@ -4663,7 +4663,7 @@
           <a:p>
             <a:fld id="{B6416A5E-5CBD-41E4-8742-691F0FE399C2}" type="datetimeFigureOut">
               <a:rPr lang="en-CA" smtClean="0"/>
-              <a:t>2018-01-31</a:t>
+              <a:t>2018-02-01</a:t>
             </a:fld>
             <a:endParaRPr lang="en-CA"/>
           </a:p>
@@ -4859,7 +4859,7 @@
           <a:p>
             <a:fld id="{B6416A5E-5CBD-41E4-8742-691F0FE399C2}" type="datetimeFigureOut">
               <a:rPr lang="en-CA" smtClean="0"/>
-              <a:t>2018-01-31</a:t>
+              <a:t>2018-02-01</a:t>
             </a:fld>
             <a:endParaRPr lang="en-CA"/>
           </a:p>
@@ -5122,7 +5122,7 @@
           <a:p>
             <a:fld id="{B6416A5E-5CBD-41E4-8742-691F0FE399C2}" type="datetimeFigureOut">
               <a:rPr lang="en-CA" smtClean="0"/>
-              <a:t>2018-01-31</a:t>
+              <a:t>2018-02-01</a:t>
             </a:fld>
             <a:endParaRPr lang="en-CA"/>
           </a:p>
@@ -5556,7 +5556,7 @@
           <a:p>
             <a:fld id="{B6416A5E-5CBD-41E4-8742-691F0FE399C2}" type="datetimeFigureOut">
               <a:rPr lang="en-CA" smtClean="0"/>
-              <a:t>2018-01-31</a:t>
+              <a:t>2018-02-01</a:t>
             </a:fld>
             <a:endParaRPr lang="en-CA"/>
           </a:p>
@@ -6102,7 +6102,7 @@
           <a:p>
             <a:fld id="{B6416A5E-5CBD-41E4-8742-691F0FE399C2}" type="datetimeFigureOut">
               <a:rPr lang="en-CA" smtClean="0"/>
-              <a:t>2018-01-31</a:t>
+              <a:t>2018-02-01</a:t>
             </a:fld>
             <a:endParaRPr lang="en-CA"/>
           </a:p>
@@ -6822,7 +6822,7 @@
           <a:p>
             <a:fld id="{B6416A5E-5CBD-41E4-8742-691F0FE399C2}" type="datetimeFigureOut">
               <a:rPr lang="en-CA" smtClean="0"/>
-              <a:t>2018-01-31</a:t>
+              <a:t>2018-02-01</a:t>
             </a:fld>
             <a:endParaRPr lang="en-CA"/>
           </a:p>
@@ -6992,7 +6992,7 @@
           <a:p>
             <a:fld id="{B6416A5E-5CBD-41E4-8742-691F0FE399C2}" type="datetimeFigureOut">
               <a:rPr lang="en-CA" smtClean="0"/>
-              <a:t>2018-01-31</a:t>
+              <a:t>2018-02-01</a:t>
             </a:fld>
             <a:endParaRPr lang="en-CA"/>
           </a:p>
@@ -7172,7 +7172,7 @@
           <a:p>
             <a:fld id="{B6416A5E-5CBD-41E4-8742-691F0FE399C2}" type="datetimeFigureOut">
               <a:rPr lang="en-CA" smtClean="0"/>
-              <a:t>2018-01-31</a:t>
+              <a:t>2018-02-01</a:t>
             </a:fld>
             <a:endParaRPr lang="en-CA"/>
           </a:p>
@@ -7342,7 +7342,7 @@
           <a:p>
             <a:fld id="{B6416A5E-5CBD-41E4-8742-691F0FE399C2}" type="datetimeFigureOut">
               <a:rPr lang="en-CA" smtClean="0"/>
-              <a:t>2018-01-31</a:t>
+              <a:t>2018-02-01</a:t>
             </a:fld>
             <a:endParaRPr lang="en-CA"/>
           </a:p>
@@ -7592,7 +7592,7 @@
           <a:p>
             <a:fld id="{B6416A5E-5CBD-41E4-8742-691F0FE399C2}" type="datetimeFigureOut">
               <a:rPr lang="en-CA" smtClean="0"/>
-              <a:t>2018-01-31</a:t>
+              <a:t>2018-02-01</a:t>
             </a:fld>
             <a:endParaRPr lang="en-CA"/>
           </a:p>
@@ -7824,7 +7824,7 @@
           <a:p>
             <a:fld id="{B6416A5E-5CBD-41E4-8742-691F0FE399C2}" type="datetimeFigureOut">
               <a:rPr lang="en-CA" smtClean="0"/>
-              <a:t>2018-01-31</a:t>
+              <a:t>2018-02-01</a:t>
             </a:fld>
             <a:endParaRPr lang="en-CA"/>
           </a:p>
@@ -8205,7 +8205,7 @@
           <a:p>
             <a:fld id="{B6416A5E-5CBD-41E4-8742-691F0FE399C2}" type="datetimeFigureOut">
               <a:rPr lang="en-CA" smtClean="0"/>
-              <a:t>2018-01-31</a:t>
+              <a:t>2018-02-01</a:t>
             </a:fld>
             <a:endParaRPr lang="en-CA"/>
           </a:p>
@@ -8323,7 +8323,7 @@
           <a:p>
             <a:fld id="{B6416A5E-5CBD-41E4-8742-691F0FE399C2}" type="datetimeFigureOut">
               <a:rPr lang="en-CA" smtClean="0"/>
-              <a:t>2018-01-31</a:t>
+              <a:t>2018-02-01</a:t>
             </a:fld>
             <a:endParaRPr lang="en-CA"/>
           </a:p>
@@ -8418,7 +8418,7 @@
           <a:p>
             <a:fld id="{B6416A5E-5CBD-41E4-8742-691F0FE399C2}" type="datetimeFigureOut">
               <a:rPr lang="en-CA" smtClean="0"/>
-              <a:t>2018-01-31</a:t>
+              <a:t>2018-02-01</a:t>
             </a:fld>
             <a:endParaRPr lang="en-CA"/>
           </a:p>
@@ -8667,7 +8667,7 @@
           <a:p>
             <a:fld id="{B6416A5E-5CBD-41E4-8742-691F0FE399C2}" type="datetimeFigureOut">
               <a:rPr lang="en-CA" smtClean="0"/>
-              <a:t>2018-01-31</a:t>
+              <a:t>2018-02-01</a:t>
             </a:fld>
             <a:endParaRPr lang="en-CA"/>
           </a:p>
@@ -8947,7 +8947,7 @@
           <a:p>
             <a:fld id="{B6416A5E-5CBD-41E4-8742-691F0FE399C2}" type="datetimeFigureOut">
               <a:rPr lang="en-CA" smtClean="0"/>
-              <a:t>2018-01-31</a:t>
+              <a:t>2018-02-01</a:t>
             </a:fld>
             <a:endParaRPr lang="en-CA"/>
           </a:p>
@@ -9063,7 +9063,7 @@
           <a:noFill/>
           <a:extLst>
             <a:ext uri="{909E8E84-426E-40dd-AFC4-6F175D3DCCD1}">
-              <a14:hiddenFill xmlns="" xmlns:a14="http://schemas.microsoft.com/office/drawing/2010/main">
+              <a14:hiddenFill xmlns:a14="http://schemas.microsoft.com/office/drawing/2010/main" xmlns="">
                 <a:solidFill>
                   <a:srgbClr val="FFFFFF"/>
                 </a:solidFill>
@@ -9137,7 +9137,7 @@
               </a:ln>
               <a:extLst>
                 <a:ext uri="{91240B29-F687-4f45-9708-019B960494DF}">
-                  <a14:hiddenLine xmlns="" xmlns:a14="http://schemas.microsoft.com/office/drawing/2010/main" w="9525">
+                  <a14:hiddenLine xmlns:a14="http://schemas.microsoft.com/office/drawing/2010/main" xmlns="" w="9525">
                     <a:solidFill>
                       <a:srgbClr val="000000"/>
                     </a:solidFill>
@@ -9227,7 +9227,7 @@
               </a:ln>
               <a:extLst>
                 <a:ext uri="{91240B29-F687-4f45-9708-019B960494DF}">
-                  <a14:hiddenLine xmlns="" xmlns:a14="http://schemas.microsoft.com/office/drawing/2010/main" w="9525">
+                  <a14:hiddenLine xmlns:a14="http://schemas.microsoft.com/office/drawing/2010/main" xmlns="" w="9525">
                     <a:solidFill>
                       <a:srgbClr val="000000"/>
                     </a:solidFill>
@@ -9317,7 +9317,7 @@
               </a:ln>
               <a:extLst>
                 <a:ext uri="{91240B29-F687-4f45-9708-019B960494DF}">
-                  <a14:hiddenLine xmlns="" xmlns:a14="http://schemas.microsoft.com/office/drawing/2010/main" w="9525">
+                  <a14:hiddenLine xmlns:a14="http://schemas.microsoft.com/office/drawing/2010/main" xmlns="" w="9525">
                     <a:solidFill>
                       <a:srgbClr val="000000"/>
                     </a:solidFill>
@@ -9379,7 +9379,7 @@
               </a:ln>
               <a:extLst>
                 <a:ext uri="{91240B29-F687-4f45-9708-019B960494DF}">
-                  <a14:hiddenLine xmlns="" xmlns:a14="http://schemas.microsoft.com/office/drawing/2010/main" w="9525">
+                  <a14:hiddenLine xmlns:a14="http://schemas.microsoft.com/office/drawing/2010/main" xmlns="" w="9525">
                     <a:solidFill>
                       <a:srgbClr val="000000"/>
                     </a:solidFill>
@@ -9469,7 +9469,7 @@
               </a:ln>
               <a:extLst>
                 <a:ext uri="{91240B29-F687-4f45-9708-019B960494DF}">
-                  <a14:hiddenLine xmlns="" xmlns:a14="http://schemas.microsoft.com/office/drawing/2010/main" w="9525">
+                  <a14:hiddenLine xmlns:a14="http://schemas.microsoft.com/office/drawing/2010/main" xmlns="" w="9525">
                     <a:solidFill>
                       <a:srgbClr val="000000"/>
                     </a:solidFill>
@@ -9531,7 +9531,7 @@
               </a:ln>
               <a:extLst>
                 <a:ext uri="{91240B29-F687-4f45-9708-019B960494DF}">
-                  <a14:hiddenLine xmlns="" xmlns:a14="http://schemas.microsoft.com/office/drawing/2010/main" w="9525">
+                  <a14:hiddenLine xmlns:a14="http://schemas.microsoft.com/office/drawing/2010/main" xmlns="" w="9525">
                     <a:solidFill>
                       <a:srgbClr val="000000"/>
                     </a:solidFill>
@@ -9593,7 +9593,7 @@
               </a:ln>
               <a:extLst>
                 <a:ext uri="{91240B29-F687-4f45-9708-019B960494DF}">
-                  <a14:hiddenLine xmlns="" xmlns:a14="http://schemas.microsoft.com/office/drawing/2010/main" w="9525">
+                  <a14:hiddenLine xmlns:a14="http://schemas.microsoft.com/office/drawing/2010/main" xmlns="" w="9525">
                     <a:solidFill>
                       <a:srgbClr val="000000"/>
                     </a:solidFill>
@@ -9683,7 +9683,7 @@
               </a:ln>
               <a:extLst>
                 <a:ext uri="{91240B29-F687-4f45-9708-019B960494DF}">
-                  <a14:hiddenLine xmlns="" xmlns:a14="http://schemas.microsoft.com/office/drawing/2010/main" w="9525">
+                  <a14:hiddenLine xmlns:a14="http://schemas.microsoft.com/office/drawing/2010/main" xmlns="" w="9525">
                     <a:solidFill>
                       <a:srgbClr val="000000"/>
                     </a:solidFill>
@@ -9773,7 +9773,7 @@
               </a:ln>
               <a:extLst>
                 <a:ext uri="{91240B29-F687-4f45-9708-019B960494DF}">
-                  <a14:hiddenLine xmlns="" xmlns:a14="http://schemas.microsoft.com/office/drawing/2010/main" w="9525">
+                  <a14:hiddenLine xmlns:a14="http://schemas.microsoft.com/office/drawing/2010/main" xmlns="" w="9525">
                     <a:solidFill>
                       <a:srgbClr val="000000"/>
                     </a:solidFill>
@@ -9835,7 +9835,7 @@
               </a:ln>
               <a:extLst>
                 <a:ext uri="{91240B29-F687-4f45-9708-019B960494DF}">
-                  <a14:hiddenLine xmlns="" xmlns:a14="http://schemas.microsoft.com/office/drawing/2010/main" w="9525">
+                  <a14:hiddenLine xmlns:a14="http://schemas.microsoft.com/office/drawing/2010/main" xmlns="" w="9525">
                     <a:solidFill>
                       <a:srgbClr val="000000"/>
                     </a:solidFill>
@@ -9945,7 +9945,7 @@
               </a:ln>
               <a:extLst>
                 <a:ext uri="{91240B29-F687-4f45-9708-019B960494DF}">
-                  <a14:hiddenLine xmlns="" xmlns:a14="http://schemas.microsoft.com/office/drawing/2010/main" w="9525">
+                  <a14:hiddenLine xmlns:a14="http://schemas.microsoft.com/office/drawing/2010/main" xmlns="" w="9525">
                     <a:solidFill>
                       <a:srgbClr val="000000"/>
                     </a:solidFill>
@@ -10029,7 +10029,7 @@
               </a:ln>
               <a:extLst>
                 <a:ext uri="{91240B29-F687-4f45-9708-019B960494DF}">
-                  <a14:hiddenLine xmlns="" xmlns:a14="http://schemas.microsoft.com/office/drawing/2010/main" w="9525">
+                  <a14:hiddenLine xmlns:a14="http://schemas.microsoft.com/office/drawing/2010/main" xmlns="" w="9525">
                     <a:solidFill>
                       <a:srgbClr val="000000"/>
                     </a:solidFill>
@@ -10091,7 +10091,7 @@
               </a:ln>
               <a:extLst>
                 <a:ext uri="{91240B29-F687-4f45-9708-019B960494DF}">
-                  <a14:hiddenLine xmlns="" xmlns:a14="http://schemas.microsoft.com/office/drawing/2010/main" w="9525">
+                  <a14:hiddenLine xmlns:a14="http://schemas.microsoft.com/office/drawing/2010/main" xmlns="" w="9525">
                     <a:solidFill>
                       <a:srgbClr val="000000"/>
                     </a:solidFill>
@@ -10153,7 +10153,7 @@
               </a:ln>
               <a:extLst>
                 <a:ext uri="{91240B29-F687-4f45-9708-019B960494DF}">
-                  <a14:hiddenLine xmlns="" xmlns:a14="http://schemas.microsoft.com/office/drawing/2010/main" w="9525">
+                  <a14:hiddenLine xmlns:a14="http://schemas.microsoft.com/office/drawing/2010/main" xmlns="" w="9525">
                     <a:solidFill>
                       <a:srgbClr val="000000"/>
                     </a:solidFill>
@@ -10243,7 +10243,7 @@
               </a:ln>
               <a:extLst>
                 <a:ext uri="{91240B29-F687-4f45-9708-019B960494DF}">
-                  <a14:hiddenLine xmlns="" xmlns:a14="http://schemas.microsoft.com/office/drawing/2010/main" w="9525">
+                  <a14:hiddenLine xmlns:a14="http://schemas.microsoft.com/office/drawing/2010/main" xmlns="" w="9525">
                     <a:solidFill>
                       <a:srgbClr val="000000"/>
                     </a:solidFill>
@@ -10277,7 +10277,7 @@
               </a:ln>
               <a:extLst>
                 <a:ext uri="{91240B29-F687-4f45-9708-019B960494DF}">
-                  <a14:hiddenLine xmlns="" xmlns:a14="http://schemas.microsoft.com/office/drawing/2010/main" w="9525">
+                  <a14:hiddenLine xmlns:a14="http://schemas.microsoft.com/office/drawing/2010/main" xmlns="" w="9525">
                     <a:solidFill>
                       <a:srgbClr val="000000"/>
                     </a:solidFill>
@@ -10342,7 +10342,7 @@
               </a:ln>
               <a:extLst>
                 <a:ext uri="{91240B29-F687-4f45-9708-019B960494DF}">
-                  <a14:hiddenLine xmlns="" xmlns:a14="http://schemas.microsoft.com/office/drawing/2010/main" w="9525">
+                  <a14:hiddenLine xmlns:a14="http://schemas.microsoft.com/office/drawing/2010/main" xmlns="" w="9525">
                     <a:solidFill>
                       <a:srgbClr val="000000"/>
                     </a:solidFill>
@@ -10432,7 +10432,7 @@
               </a:ln>
               <a:extLst>
                 <a:ext uri="{91240B29-F687-4f45-9708-019B960494DF}">
-                  <a14:hiddenLine xmlns="" xmlns:a14="http://schemas.microsoft.com/office/drawing/2010/main" w="9525">
+                  <a14:hiddenLine xmlns:a14="http://schemas.microsoft.com/office/drawing/2010/main" xmlns="" w="9525">
                     <a:solidFill>
                       <a:srgbClr val="000000"/>
                     </a:solidFill>
@@ -10494,7 +10494,7 @@
               </a:ln>
               <a:extLst>
                 <a:ext uri="{91240B29-F687-4f45-9708-019B960494DF}">
-                  <a14:hiddenLine xmlns="" xmlns:a14="http://schemas.microsoft.com/office/drawing/2010/main" w="9525">
+                  <a14:hiddenLine xmlns:a14="http://schemas.microsoft.com/office/drawing/2010/main" xmlns="" w="9525">
                     <a:solidFill>
                       <a:srgbClr val="000000"/>
                     </a:solidFill>
@@ -10584,7 +10584,7 @@
               </a:ln>
               <a:extLst>
                 <a:ext uri="{91240B29-F687-4f45-9708-019B960494DF}">
-                  <a14:hiddenLine xmlns="" xmlns:a14="http://schemas.microsoft.com/office/drawing/2010/main" w="9525">
+                  <a14:hiddenLine xmlns:a14="http://schemas.microsoft.com/office/drawing/2010/main" xmlns="" w="9525">
                     <a:solidFill>
                       <a:srgbClr val="000000"/>
                     </a:solidFill>
@@ -10649,7 +10649,7 @@
               </a:ln>
               <a:extLst>
                 <a:ext uri="{91240B29-F687-4f45-9708-019B960494DF}">
-                  <a14:hiddenLine xmlns="" xmlns:a14="http://schemas.microsoft.com/office/drawing/2010/main" w="9525">
+                  <a14:hiddenLine xmlns:a14="http://schemas.microsoft.com/office/drawing/2010/main" xmlns="" w="9525">
                     <a:solidFill>
                       <a:srgbClr val="000000"/>
                     </a:solidFill>
@@ -10711,7 +10711,7 @@
               </a:ln>
               <a:extLst>
                 <a:ext uri="{91240B29-F687-4f45-9708-019B960494DF}">
-                  <a14:hiddenLine xmlns="" xmlns:a14="http://schemas.microsoft.com/office/drawing/2010/main" w="9525">
+                  <a14:hiddenLine xmlns:a14="http://schemas.microsoft.com/office/drawing/2010/main" xmlns="" w="9525">
                     <a:solidFill>
                       <a:srgbClr val="000000"/>
                     </a:solidFill>
@@ -10801,7 +10801,7 @@
               </a:ln>
               <a:extLst>
                 <a:ext uri="{91240B29-F687-4f45-9708-019B960494DF}">
-                  <a14:hiddenLine xmlns="" xmlns:a14="http://schemas.microsoft.com/office/drawing/2010/main" w="9525">
+                  <a14:hiddenLine xmlns:a14="http://schemas.microsoft.com/office/drawing/2010/main" xmlns="" w="9525">
                     <a:solidFill>
                       <a:srgbClr val="000000"/>
                     </a:solidFill>
@@ -10891,7 +10891,7 @@
               </a:ln>
               <a:extLst>
                 <a:ext uri="{91240B29-F687-4f45-9708-019B960494DF}">
-                  <a14:hiddenLine xmlns="" xmlns:a14="http://schemas.microsoft.com/office/drawing/2010/main" w="9525">
+                  <a14:hiddenLine xmlns:a14="http://schemas.microsoft.com/office/drawing/2010/main" xmlns="" w="9525">
                     <a:solidFill>
                       <a:srgbClr val="000000"/>
                     </a:solidFill>
@@ -10956,7 +10956,7 @@
               </a:ln>
               <a:extLst>
                 <a:ext uri="{91240B29-F687-4f45-9708-019B960494DF}">
-                  <a14:hiddenLine xmlns="" xmlns:a14="http://schemas.microsoft.com/office/drawing/2010/main" w="9525">
+                  <a14:hiddenLine xmlns:a14="http://schemas.microsoft.com/office/drawing/2010/main" xmlns="" w="9525">
                     <a:solidFill>
                       <a:srgbClr val="000000"/>
                     </a:solidFill>
@@ -11076,7 +11076,7 @@
               </a:ln>
               <a:extLst>
                 <a:ext uri="{91240B29-F687-4f45-9708-019B960494DF}">
-                  <a14:hiddenLine xmlns="" xmlns:a14="http://schemas.microsoft.com/office/drawing/2010/main" w="9525">
+                  <a14:hiddenLine xmlns:a14="http://schemas.microsoft.com/office/drawing/2010/main" xmlns="" w="9525">
                     <a:solidFill>
                       <a:srgbClr val="000000"/>
                     </a:solidFill>
@@ -11174,7 +11174,7 @@
               </a:ln>
               <a:extLst>
                 <a:ext uri="{91240B29-F687-4f45-9708-019B960494DF}">
-                  <a14:hiddenLine xmlns="" xmlns:a14="http://schemas.microsoft.com/office/drawing/2010/main" w="9525">
+                  <a14:hiddenLine xmlns:a14="http://schemas.microsoft.com/office/drawing/2010/main" xmlns="" w="9525">
                     <a:solidFill>
                       <a:srgbClr val="000000"/>
                     </a:solidFill>
@@ -11289,7 +11289,7 @@
               </a:ln>
               <a:extLst>
                 <a:ext uri="{91240B29-F687-4f45-9708-019B960494DF}">
-                  <a14:hiddenLine xmlns="" xmlns:a14="http://schemas.microsoft.com/office/drawing/2010/main" w="9525">
+                  <a14:hiddenLine xmlns:a14="http://schemas.microsoft.com/office/drawing/2010/main" xmlns="" w="9525">
                     <a:solidFill>
                       <a:srgbClr val="000000"/>
                     </a:solidFill>
@@ -11379,7 +11379,7 @@
               </a:ln>
               <a:extLst>
                 <a:ext uri="{91240B29-F687-4f45-9708-019B960494DF}">
-                  <a14:hiddenLine xmlns="" xmlns:a14="http://schemas.microsoft.com/office/drawing/2010/main" w="9525">
+                  <a14:hiddenLine xmlns:a14="http://schemas.microsoft.com/office/drawing/2010/main" xmlns="" w="9525">
                     <a:solidFill>
                       <a:srgbClr val="000000"/>
                     </a:solidFill>
@@ -11444,7 +11444,7 @@
               </a:ln>
               <a:extLst>
                 <a:ext uri="{91240B29-F687-4f45-9708-019B960494DF}">
-                  <a14:hiddenLine xmlns="" xmlns:a14="http://schemas.microsoft.com/office/drawing/2010/main" w="9525">
+                  <a14:hiddenLine xmlns:a14="http://schemas.microsoft.com/office/drawing/2010/main" xmlns="" w="9525">
                     <a:solidFill>
                       <a:srgbClr val="000000"/>
                     </a:solidFill>
@@ -11534,7 +11534,7 @@
               </a:ln>
               <a:extLst>
                 <a:ext uri="{91240B29-F687-4f45-9708-019B960494DF}">
-                  <a14:hiddenLine xmlns="" xmlns:a14="http://schemas.microsoft.com/office/drawing/2010/main" w="9525">
+                  <a14:hiddenLine xmlns:a14="http://schemas.microsoft.com/office/drawing/2010/main" xmlns="" w="9525">
                     <a:solidFill>
                       <a:srgbClr val="000000"/>
                     </a:solidFill>
@@ -11602,7 +11602,7 @@
               </a:ln>
               <a:extLst>
                 <a:ext uri="{91240B29-F687-4f45-9708-019B960494DF}">
-                  <a14:hiddenLine xmlns="" xmlns:a14="http://schemas.microsoft.com/office/drawing/2010/main" w="9525">
+                  <a14:hiddenLine xmlns:a14="http://schemas.microsoft.com/office/drawing/2010/main" xmlns="" w="9525">
                     <a:solidFill>
                       <a:srgbClr val="000000"/>
                     </a:solidFill>
@@ -11692,7 +11692,7 @@
               </a:ln>
               <a:extLst>
                 <a:ext uri="{91240B29-F687-4f45-9708-019B960494DF}">
-                  <a14:hiddenLine xmlns="" xmlns:a14="http://schemas.microsoft.com/office/drawing/2010/main" w="9525">
+                  <a14:hiddenLine xmlns:a14="http://schemas.microsoft.com/office/drawing/2010/main" xmlns="" w="9525">
                     <a:solidFill>
                       <a:srgbClr val="000000"/>
                     </a:solidFill>
@@ -11760,7 +11760,7 @@
               </a:ln>
               <a:extLst>
                 <a:ext uri="{91240B29-F687-4f45-9708-019B960494DF}">
-                  <a14:hiddenLine xmlns="" xmlns:a14="http://schemas.microsoft.com/office/drawing/2010/main" w="9525">
+                  <a14:hiddenLine xmlns:a14="http://schemas.microsoft.com/office/drawing/2010/main" xmlns="" w="9525">
                     <a:solidFill>
                       <a:srgbClr val="000000"/>
                     </a:solidFill>
@@ -11850,7 +11850,7 @@
               </a:ln>
               <a:extLst>
                 <a:ext uri="{91240B29-F687-4f45-9708-019B960494DF}">
-                  <a14:hiddenLine xmlns="" xmlns:a14="http://schemas.microsoft.com/office/drawing/2010/main" w="9525">
+                  <a14:hiddenLine xmlns:a14="http://schemas.microsoft.com/office/drawing/2010/main" xmlns="" w="9525">
                     <a:solidFill>
                       <a:srgbClr val="000000"/>
                     </a:solidFill>
@@ -11884,7 +11884,7 @@
               </a:ln>
               <a:extLst>
                 <a:ext uri="{91240B29-F687-4f45-9708-019B960494DF}">
-                  <a14:hiddenLine xmlns="" xmlns:a14="http://schemas.microsoft.com/office/drawing/2010/main" w="9525">
+                  <a14:hiddenLine xmlns:a14="http://schemas.microsoft.com/office/drawing/2010/main" xmlns="" w="9525">
                     <a:solidFill>
                       <a:srgbClr val="000000"/>
                     </a:solidFill>
@@ -12024,7 +12024,7 @@
           <a:p>
             <a:fld id="{B6416A5E-5CBD-41E4-8742-691F0FE399C2}" type="datetimeFigureOut">
               <a:rPr lang="en-CA" smtClean="0"/>
-              <a:t>2018-01-31</a:t>
+              <a:t>2018-02-01</a:t>
             </a:fld>
             <a:endParaRPr lang="en-CA"/>
           </a:p>
@@ -12758,7 +12758,15 @@
             <a:pPr lvl="1"/>
             <a:r>
               <a:rPr lang="en-US" altLang="en-US" dirty="0"/>
-              <a:t>When requesting approval, the request will either automatically be sent any of the approvers for that software or the user can manually select with approver they would like.</a:t>
+              <a:t>When requesting approval, the request will either automatically </a:t>
+            </a:r>
+            <a:r>
+              <a:rPr lang="en-US" altLang="en-US"/>
+              <a:t>be sent to </a:t>
+            </a:r>
+            <a:r>
+              <a:rPr lang="en-US" altLang="en-US" dirty="0"/>
+              <a:t>any of the approvers for that software or the user can manually select with approver they would like.</a:t>
             </a:r>
           </a:p>
           <a:p>

</xml_diff>

<commit_message>
Update: fixed missed word
</commit_message>
<xml_diff>
--- a/Milestone 3/ENSE 470 Milestone 3.pptx
+++ b/Milestone 3/ENSE 470 Milestone 3.pptx
@@ -170,7 +170,7 @@
           <a:noFill/>
           <a:extLst>
             <a:ext uri="{909E8E84-426E-40dd-AFC4-6F175D3DCCD1}">
-              <a14:hiddenFill xmlns:a14="http://schemas.microsoft.com/office/drawing/2010/main" xmlns="">
+              <a14:hiddenFill xmlns="" xmlns:a14="http://schemas.microsoft.com/office/drawing/2010/main">
                 <a:solidFill>
                   <a:srgbClr val="FFFFFF"/>
                 </a:solidFill>
@@ -230,7 +230,7 @@
             </a:ln>
             <a:extLst>
               <a:ext uri="{91240B29-F687-4f45-9708-019B960494DF}">
-                <a14:hiddenLine xmlns:a14="http://schemas.microsoft.com/office/drawing/2010/main" xmlns="" w="9525">
+                <a14:hiddenLine xmlns="" xmlns:a14="http://schemas.microsoft.com/office/drawing/2010/main" w="9525">
                   <a:solidFill>
                     <a:srgbClr val="000000"/>
                   </a:solidFill>
@@ -320,7 +320,7 @@
             </a:ln>
             <a:extLst>
               <a:ext uri="{91240B29-F687-4f45-9708-019B960494DF}">
-                <a14:hiddenLine xmlns:a14="http://schemas.microsoft.com/office/drawing/2010/main" xmlns="" w="9525">
+                <a14:hiddenLine xmlns="" xmlns:a14="http://schemas.microsoft.com/office/drawing/2010/main" w="9525">
                   <a:solidFill>
                     <a:srgbClr val="000000"/>
                   </a:solidFill>
@@ -410,7 +410,7 @@
             </a:ln>
             <a:extLst>
               <a:ext uri="{91240B29-F687-4f45-9708-019B960494DF}">
-                <a14:hiddenLine xmlns:a14="http://schemas.microsoft.com/office/drawing/2010/main" xmlns="" w="9525">
+                <a14:hiddenLine xmlns="" xmlns:a14="http://schemas.microsoft.com/office/drawing/2010/main" w="9525">
                   <a:solidFill>
                     <a:srgbClr val="000000"/>
                   </a:solidFill>
@@ -444,7 +444,7 @@
             </a:ln>
             <a:extLst>
               <a:ext uri="{91240B29-F687-4f45-9708-019B960494DF}">
-                <a14:hiddenLine xmlns:a14="http://schemas.microsoft.com/office/drawing/2010/main" xmlns="" w="9525">
+                <a14:hiddenLine xmlns="" xmlns:a14="http://schemas.microsoft.com/office/drawing/2010/main" w="9525">
                   <a:solidFill>
                     <a:srgbClr val="000000"/>
                   </a:solidFill>
@@ -534,7 +534,7 @@
             </a:ln>
             <a:extLst>
               <a:ext uri="{91240B29-F687-4f45-9708-019B960494DF}">
-                <a14:hiddenLine xmlns:a14="http://schemas.microsoft.com/office/drawing/2010/main" xmlns="" w="9525">
+                <a14:hiddenLine xmlns="" xmlns:a14="http://schemas.microsoft.com/office/drawing/2010/main" w="9525">
                   <a:solidFill>
                     <a:srgbClr val="000000"/>
                   </a:solidFill>
@@ -596,7 +596,7 @@
             </a:ln>
             <a:extLst>
               <a:ext uri="{91240B29-F687-4f45-9708-019B960494DF}">
-                <a14:hiddenLine xmlns:a14="http://schemas.microsoft.com/office/drawing/2010/main" xmlns="" w="9525">
+                <a14:hiddenLine xmlns="" xmlns:a14="http://schemas.microsoft.com/office/drawing/2010/main" w="9525">
                   <a:solidFill>
                     <a:srgbClr val="000000"/>
                   </a:solidFill>
@@ -658,7 +658,7 @@
             </a:ln>
             <a:extLst>
               <a:ext uri="{91240B29-F687-4f45-9708-019B960494DF}">
-                <a14:hiddenLine xmlns:a14="http://schemas.microsoft.com/office/drawing/2010/main" xmlns="" w="9525">
+                <a14:hiddenLine xmlns="" xmlns:a14="http://schemas.microsoft.com/office/drawing/2010/main" w="9525">
                   <a:solidFill>
                     <a:srgbClr val="000000"/>
                   </a:solidFill>
@@ -748,7 +748,7 @@
             </a:ln>
             <a:extLst>
               <a:ext uri="{91240B29-F687-4f45-9708-019B960494DF}">
-                <a14:hiddenLine xmlns:a14="http://schemas.microsoft.com/office/drawing/2010/main" xmlns="" w="9525">
+                <a14:hiddenLine xmlns="" xmlns:a14="http://schemas.microsoft.com/office/drawing/2010/main" w="9525">
                   <a:solidFill>
                     <a:srgbClr val="000000"/>
                   </a:solidFill>
@@ -810,7 +810,7 @@
             </a:ln>
             <a:extLst>
               <a:ext uri="{91240B29-F687-4f45-9708-019B960494DF}">
-                <a14:hiddenLine xmlns:a14="http://schemas.microsoft.com/office/drawing/2010/main" xmlns="" w="9525">
+                <a14:hiddenLine xmlns="" xmlns:a14="http://schemas.microsoft.com/office/drawing/2010/main" w="9525">
                   <a:solidFill>
                     <a:srgbClr val="000000"/>
                   </a:solidFill>
@@ -872,7 +872,7 @@
             </a:ln>
             <a:extLst>
               <a:ext uri="{91240B29-F687-4f45-9708-019B960494DF}">
-                <a14:hiddenLine xmlns:a14="http://schemas.microsoft.com/office/drawing/2010/main" xmlns="" w="9525">
+                <a14:hiddenLine xmlns="" xmlns:a14="http://schemas.microsoft.com/office/drawing/2010/main" w="9525">
                   <a:solidFill>
                     <a:srgbClr val="000000"/>
                   </a:solidFill>
@@ -962,7 +962,7 @@
             </a:ln>
             <a:extLst>
               <a:ext uri="{91240B29-F687-4f45-9708-019B960494DF}">
-                <a14:hiddenLine xmlns:a14="http://schemas.microsoft.com/office/drawing/2010/main" xmlns="" w="9525">
+                <a14:hiddenLine xmlns="" xmlns:a14="http://schemas.microsoft.com/office/drawing/2010/main" w="9525">
                   <a:solidFill>
                     <a:srgbClr val="000000"/>
                   </a:solidFill>
@@ -1052,7 +1052,7 @@
             </a:ln>
             <a:extLst>
               <a:ext uri="{91240B29-F687-4f45-9708-019B960494DF}">
-                <a14:hiddenLine xmlns:a14="http://schemas.microsoft.com/office/drawing/2010/main" xmlns="" w="9525">
+                <a14:hiddenLine xmlns="" xmlns:a14="http://schemas.microsoft.com/office/drawing/2010/main" w="9525">
                   <a:solidFill>
                     <a:srgbClr val="000000"/>
                   </a:solidFill>
@@ -1114,7 +1114,7 @@
             </a:ln>
             <a:extLst>
               <a:ext uri="{91240B29-F687-4f45-9708-019B960494DF}">
-                <a14:hiddenLine xmlns:a14="http://schemas.microsoft.com/office/drawing/2010/main" xmlns="" w="9525">
+                <a14:hiddenLine xmlns="" xmlns:a14="http://schemas.microsoft.com/office/drawing/2010/main" w="9525">
                   <a:solidFill>
                     <a:srgbClr val="000000"/>
                   </a:solidFill>
@@ -1224,7 +1224,7 @@
             </a:ln>
             <a:extLst>
               <a:ext uri="{91240B29-F687-4f45-9708-019B960494DF}">
-                <a14:hiddenLine xmlns:a14="http://schemas.microsoft.com/office/drawing/2010/main" xmlns="" w="9525">
+                <a14:hiddenLine xmlns="" xmlns:a14="http://schemas.microsoft.com/office/drawing/2010/main" w="9525">
                   <a:solidFill>
                     <a:srgbClr val="000000"/>
                   </a:solidFill>
@@ -1286,7 +1286,7 @@
             </a:ln>
             <a:extLst>
               <a:ext uri="{91240B29-F687-4f45-9708-019B960494DF}">
-                <a14:hiddenLine xmlns:a14="http://schemas.microsoft.com/office/drawing/2010/main" xmlns="" w="9525">
+                <a14:hiddenLine xmlns="" xmlns:a14="http://schemas.microsoft.com/office/drawing/2010/main" w="9525">
                   <a:solidFill>
                     <a:srgbClr val="000000"/>
                   </a:solidFill>
@@ -1376,7 +1376,7 @@
             </a:ln>
             <a:extLst>
               <a:ext uri="{91240B29-F687-4f45-9708-019B960494DF}">
-                <a14:hiddenLine xmlns:a14="http://schemas.microsoft.com/office/drawing/2010/main" xmlns="" w="9525">
+                <a14:hiddenLine xmlns="" xmlns:a14="http://schemas.microsoft.com/office/drawing/2010/main" w="9525">
                   <a:solidFill>
                     <a:srgbClr val="000000"/>
                   </a:solidFill>
@@ -1466,7 +1466,7 @@
             </a:ln>
             <a:extLst>
               <a:ext uri="{91240B29-F687-4f45-9708-019B960494DF}">
-                <a14:hiddenLine xmlns:a14="http://schemas.microsoft.com/office/drawing/2010/main" xmlns="" w="9525">
+                <a14:hiddenLine xmlns="" xmlns:a14="http://schemas.microsoft.com/office/drawing/2010/main" w="9525">
                   <a:solidFill>
                     <a:srgbClr val="000000"/>
                   </a:solidFill>
@@ -1528,7 +1528,7 @@
             </a:ln>
             <a:extLst>
               <a:ext uri="{91240B29-F687-4f45-9708-019B960494DF}">
-                <a14:hiddenLine xmlns:a14="http://schemas.microsoft.com/office/drawing/2010/main" xmlns="" w="9525">
+                <a14:hiddenLine xmlns="" xmlns:a14="http://schemas.microsoft.com/office/drawing/2010/main" w="9525">
                   <a:solidFill>
                     <a:srgbClr val="000000"/>
                   </a:solidFill>
@@ -1618,7 +1618,7 @@
             </a:ln>
             <a:extLst>
               <a:ext uri="{91240B29-F687-4f45-9708-019B960494DF}">
-                <a14:hiddenLine xmlns:a14="http://schemas.microsoft.com/office/drawing/2010/main" xmlns="" w="9525">
+                <a14:hiddenLine xmlns="" xmlns:a14="http://schemas.microsoft.com/office/drawing/2010/main" w="9525">
                   <a:solidFill>
                     <a:srgbClr val="000000"/>
                   </a:solidFill>
@@ -1708,7 +1708,7 @@
             </a:ln>
             <a:extLst>
               <a:ext uri="{91240B29-F687-4f45-9708-019B960494DF}">
-                <a14:hiddenLine xmlns:a14="http://schemas.microsoft.com/office/drawing/2010/main" xmlns="" w="9525">
+                <a14:hiddenLine xmlns="" xmlns:a14="http://schemas.microsoft.com/office/drawing/2010/main" w="9525">
                   <a:solidFill>
                     <a:srgbClr val="000000"/>
                   </a:solidFill>
@@ -1764,7 +1764,7 @@
             </a:ln>
             <a:extLst>
               <a:ext uri="{91240B29-F687-4f45-9708-019B960494DF}">
-                <a14:hiddenLine xmlns:a14="http://schemas.microsoft.com/office/drawing/2010/main" xmlns="" w="9525">
+                <a14:hiddenLine xmlns="" xmlns:a14="http://schemas.microsoft.com/office/drawing/2010/main" w="9525">
                   <a:solidFill>
                     <a:srgbClr val="000000"/>
                   </a:solidFill>
@@ -1854,7 +1854,7 @@
             </a:ln>
             <a:extLst>
               <a:ext uri="{91240B29-F687-4f45-9708-019B960494DF}">
-                <a14:hiddenLine xmlns:a14="http://schemas.microsoft.com/office/drawing/2010/main" xmlns="" w="9525">
+                <a14:hiddenLine xmlns="" xmlns:a14="http://schemas.microsoft.com/office/drawing/2010/main" w="9525">
                   <a:solidFill>
                     <a:srgbClr val="000000"/>
                   </a:solidFill>
@@ -1910,7 +1910,7 @@
             </a:ln>
             <a:extLst>
               <a:ext uri="{91240B29-F687-4f45-9708-019B960494DF}">
-                <a14:hiddenLine xmlns:a14="http://schemas.microsoft.com/office/drawing/2010/main" xmlns="" w="9525">
+                <a14:hiddenLine xmlns="" xmlns:a14="http://schemas.microsoft.com/office/drawing/2010/main" w="9525">
                   <a:solidFill>
                     <a:srgbClr val="000000"/>
                   </a:solidFill>
@@ -2000,7 +2000,7 @@
             </a:ln>
             <a:extLst>
               <a:ext uri="{91240B29-F687-4f45-9708-019B960494DF}">
-                <a14:hiddenLine xmlns:a14="http://schemas.microsoft.com/office/drawing/2010/main" xmlns="" w="9525">
+                <a14:hiddenLine xmlns="" xmlns:a14="http://schemas.microsoft.com/office/drawing/2010/main" w="9525">
                   <a:solidFill>
                     <a:srgbClr val="000000"/>
                   </a:solidFill>
@@ -2068,7 +2068,7 @@
             </a:ln>
             <a:extLst>
               <a:ext uri="{91240B29-F687-4f45-9708-019B960494DF}">
-                <a14:hiddenLine xmlns:a14="http://schemas.microsoft.com/office/drawing/2010/main" xmlns="" w="9525">
+                <a14:hiddenLine xmlns="" xmlns:a14="http://schemas.microsoft.com/office/drawing/2010/main" w="9525">
                   <a:solidFill>
                     <a:srgbClr val="000000"/>
                   </a:solidFill>
@@ -2158,7 +2158,7 @@
             </a:ln>
             <a:extLst>
               <a:ext uri="{91240B29-F687-4f45-9708-019B960494DF}">
-                <a14:hiddenLine xmlns:a14="http://schemas.microsoft.com/office/drawing/2010/main" xmlns="" w="9525">
+                <a14:hiddenLine xmlns="" xmlns:a14="http://schemas.microsoft.com/office/drawing/2010/main" w="9525">
                   <a:solidFill>
                     <a:srgbClr val="000000"/>
                   </a:solidFill>
@@ -2226,7 +2226,7 @@
             </a:ln>
             <a:extLst>
               <a:ext uri="{91240B29-F687-4f45-9708-019B960494DF}">
-                <a14:hiddenLine xmlns:a14="http://schemas.microsoft.com/office/drawing/2010/main" xmlns="" w="9525">
+                <a14:hiddenLine xmlns="" xmlns:a14="http://schemas.microsoft.com/office/drawing/2010/main" w="9525">
                   <a:solidFill>
                     <a:srgbClr val="000000"/>
                   </a:solidFill>
@@ -2316,7 +2316,7 @@
             </a:ln>
             <a:extLst>
               <a:ext uri="{91240B29-F687-4f45-9708-019B960494DF}">
-                <a14:hiddenLine xmlns:a14="http://schemas.microsoft.com/office/drawing/2010/main" xmlns="" w="9525">
+                <a14:hiddenLine xmlns="" xmlns:a14="http://schemas.microsoft.com/office/drawing/2010/main" w="9525">
                   <a:solidFill>
                     <a:srgbClr val="000000"/>
                   </a:solidFill>
@@ -2350,7 +2350,7 @@
             </a:ln>
             <a:extLst>
               <a:ext uri="{91240B29-F687-4f45-9708-019B960494DF}">
-                <a14:hiddenLine xmlns:a14="http://schemas.microsoft.com/office/drawing/2010/main" xmlns="" w="9525">
+                <a14:hiddenLine xmlns="" xmlns:a14="http://schemas.microsoft.com/office/drawing/2010/main" w="9525">
                   <a:solidFill>
                     <a:srgbClr val="000000"/>
                   </a:solidFill>
@@ -2440,7 +2440,7 @@
             </a:ln>
             <a:extLst>
               <a:ext uri="{91240B29-F687-4f45-9708-019B960494DF}">
-                <a14:hiddenLine xmlns:a14="http://schemas.microsoft.com/office/drawing/2010/main" xmlns="" w="9525">
+                <a14:hiddenLine xmlns="" xmlns:a14="http://schemas.microsoft.com/office/drawing/2010/main" w="9525">
                   <a:solidFill>
                     <a:srgbClr val="000000"/>
                   </a:solidFill>
@@ -2502,7 +2502,7 @@
             </a:ln>
             <a:extLst>
               <a:ext uri="{91240B29-F687-4f45-9708-019B960494DF}">
-                <a14:hiddenLine xmlns:a14="http://schemas.microsoft.com/office/drawing/2010/main" xmlns="" w="9525">
+                <a14:hiddenLine xmlns="" xmlns:a14="http://schemas.microsoft.com/office/drawing/2010/main" w="9525">
                   <a:solidFill>
                     <a:srgbClr val="000000"/>
                   </a:solidFill>
@@ -2564,7 +2564,7 @@
             </a:ln>
             <a:extLst>
               <a:ext uri="{91240B29-F687-4f45-9708-019B960494DF}">
-                <a14:hiddenLine xmlns:a14="http://schemas.microsoft.com/office/drawing/2010/main" xmlns="" w="9525">
+                <a14:hiddenLine xmlns="" xmlns:a14="http://schemas.microsoft.com/office/drawing/2010/main" w="9525">
                   <a:solidFill>
                     <a:srgbClr val="000000"/>
                   </a:solidFill>
@@ -2654,7 +2654,7 @@
             </a:ln>
             <a:extLst>
               <a:ext uri="{91240B29-F687-4f45-9708-019B960494DF}">
-                <a14:hiddenLine xmlns:a14="http://schemas.microsoft.com/office/drawing/2010/main" xmlns="" w="9525">
+                <a14:hiddenLine xmlns="" xmlns:a14="http://schemas.microsoft.com/office/drawing/2010/main" w="9525">
                   <a:solidFill>
                     <a:srgbClr val="000000"/>
                   </a:solidFill>
@@ -2722,7 +2722,7 @@
             </a:ln>
             <a:extLst>
               <a:ext uri="{91240B29-F687-4f45-9708-019B960494DF}">
-                <a14:hiddenLine xmlns:a14="http://schemas.microsoft.com/office/drawing/2010/main" xmlns="" w="9525">
+                <a14:hiddenLine xmlns="" xmlns:a14="http://schemas.microsoft.com/office/drawing/2010/main" w="9525">
                   <a:solidFill>
                     <a:srgbClr val="000000"/>
                   </a:solidFill>
@@ -2784,7 +2784,7 @@
             </a:ln>
             <a:extLst>
               <a:ext uri="{91240B29-F687-4f45-9708-019B960494DF}">
-                <a14:hiddenLine xmlns:a14="http://schemas.microsoft.com/office/drawing/2010/main" xmlns="" w="9525">
+                <a14:hiddenLine xmlns="" xmlns:a14="http://schemas.microsoft.com/office/drawing/2010/main" w="9525">
                   <a:solidFill>
                     <a:srgbClr val="000000"/>
                   </a:solidFill>
@@ -2874,7 +2874,7 @@
             </a:ln>
             <a:extLst>
               <a:ext uri="{91240B29-F687-4f45-9708-019B960494DF}">
-                <a14:hiddenLine xmlns:a14="http://schemas.microsoft.com/office/drawing/2010/main" xmlns="" w="9525">
+                <a14:hiddenLine xmlns="" xmlns:a14="http://schemas.microsoft.com/office/drawing/2010/main" w="9525">
                   <a:solidFill>
                     <a:srgbClr val="000000"/>
                   </a:solidFill>
@@ -2936,7 +2936,7 @@
             </a:ln>
             <a:extLst>
               <a:ext uri="{91240B29-F687-4f45-9708-019B960494DF}">
-                <a14:hiddenLine xmlns:a14="http://schemas.microsoft.com/office/drawing/2010/main" xmlns="" w="9525">
+                <a14:hiddenLine xmlns="" xmlns:a14="http://schemas.microsoft.com/office/drawing/2010/main" w="9525">
                   <a:solidFill>
                     <a:srgbClr val="000000"/>
                   </a:solidFill>
@@ -3026,7 +3026,7 @@
             </a:ln>
             <a:extLst>
               <a:ext uri="{91240B29-F687-4f45-9708-019B960494DF}">
-                <a14:hiddenLine xmlns:a14="http://schemas.microsoft.com/office/drawing/2010/main" xmlns="" w="9525">
+                <a14:hiddenLine xmlns="" xmlns:a14="http://schemas.microsoft.com/office/drawing/2010/main" w="9525">
                   <a:solidFill>
                     <a:srgbClr val="000000"/>
                   </a:solidFill>
@@ -3088,7 +3088,7 @@
             </a:ln>
             <a:extLst>
               <a:ext uri="{91240B29-F687-4f45-9708-019B960494DF}">
-                <a14:hiddenLine xmlns:a14="http://schemas.microsoft.com/office/drawing/2010/main" xmlns="" w="9525">
+                <a14:hiddenLine xmlns="" xmlns:a14="http://schemas.microsoft.com/office/drawing/2010/main" w="9525">
                   <a:solidFill>
                     <a:srgbClr val="000000"/>
                   </a:solidFill>
@@ -3178,7 +3178,7 @@
             </a:ln>
             <a:extLst>
               <a:ext uri="{91240B29-F687-4f45-9708-019B960494DF}">
-                <a14:hiddenLine xmlns:a14="http://schemas.microsoft.com/office/drawing/2010/main" xmlns="" w="9525">
+                <a14:hiddenLine xmlns="" xmlns:a14="http://schemas.microsoft.com/office/drawing/2010/main" w="9525">
                   <a:solidFill>
                     <a:srgbClr val="000000"/>
                   </a:solidFill>
@@ -3212,7 +3212,7 @@
             </a:ln>
             <a:extLst>
               <a:ext uri="{91240B29-F687-4f45-9708-019B960494DF}">
-                <a14:hiddenLine xmlns:a14="http://schemas.microsoft.com/office/drawing/2010/main" xmlns="" w="9525">
+                <a14:hiddenLine xmlns="" xmlns:a14="http://schemas.microsoft.com/office/drawing/2010/main" w="9525">
                   <a:solidFill>
                     <a:srgbClr val="000000"/>
                   </a:solidFill>
@@ -3277,7 +3277,7 @@
             </a:ln>
             <a:extLst>
               <a:ext uri="{91240B29-F687-4f45-9708-019B960494DF}">
-                <a14:hiddenLine xmlns:a14="http://schemas.microsoft.com/office/drawing/2010/main" xmlns="" w="9525">
+                <a14:hiddenLine xmlns="" xmlns:a14="http://schemas.microsoft.com/office/drawing/2010/main" w="9525">
                   <a:solidFill>
                     <a:srgbClr val="000000"/>
                   </a:solidFill>
@@ -3367,7 +3367,7 @@
             </a:ln>
             <a:extLst>
               <a:ext uri="{91240B29-F687-4f45-9708-019B960494DF}">
-                <a14:hiddenLine xmlns:a14="http://schemas.microsoft.com/office/drawing/2010/main" xmlns="" w="9525">
+                <a14:hiddenLine xmlns="" xmlns:a14="http://schemas.microsoft.com/office/drawing/2010/main" w="9525">
                   <a:solidFill>
                     <a:srgbClr val="000000"/>
                   </a:solidFill>
@@ -3429,7 +3429,7 @@
             </a:ln>
             <a:extLst>
               <a:ext uri="{91240B29-F687-4f45-9708-019B960494DF}">
-                <a14:hiddenLine xmlns:a14="http://schemas.microsoft.com/office/drawing/2010/main" xmlns="" w="9525">
+                <a14:hiddenLine xmlns="" xmlns:a14="http://schemas.microsoft.com/office/drawing/2010/main" w="9525">
                   <a:solidFill>
                     <a:srgbClr val="000000"/>
                   </a:solidFill>
@@ -3519,7 +3519,7 @@
             </a:ln>
             <a:extLst>
               <a:ext uri="{91240B29-F687-4f45-9708-019B960494DF}">
-                <a14:hiddenLine xmlns:a14="http://schemas.microsoft.com/office/drawing/2010/main" xmlns="" w="9525">
+                <a14:hiddenLine xmlns="" xmlns:a14="http://schemas.microsoft.com/office/drawing/2010/main" w="9525">
                   <a:solidFill>
                     <a:srgbClr val="000000"/>
                   </a:solidFill>
@@ -3609,7 +3609,7 @@
             </a:ln>
             <a:extLst>
               <a:ext uri="{91240B29-F687-4f45-9708-019B960494DF}">
-                <a14:hiddenLine xmlns:a14="http://schemas.microsoft.com/office/drawing/2010/main" xmlns="" w="9525">
+                <a14:hiddenLine xmlns="" xmlns:a14="http://schemas.microsoft.com/office/drawing/2010/main" w="9525">
                   <a:solidFill>
                     <a:srgbClr val="000000"/>
                   </a:solidFill>
@@ -3674,7 +3674,7 @@
             </a:ln>
             <a:extLst>
               <a:ext uri="{91240B29-F687-4f45-9708-019B960494DF}">
-                <a14:hiddenLine xmlns:a14="http://schemas.microsoft.com/office/drawing/2010/main" xmlns="" w="9525">
+                <a14:hiddenLine xmlns="" xmlns:a14="http://schemas.microsoft.com/office/drawing/2010/main" w="9525">
                   <a:solidFill>
                     <a:srgbClr val="000000"/>
                   </a:solidFill>
@@ -3736,7 +3736,7 @@
             </a:ln>
             <a:extLst>
               <a:ext uri="{91240B29-F687-4f45-9708-019B960494DF}">
-                <a14:hiddenLine xmlns:a14="http://schemas.microsoft.com/office/drawing/2010/main" xmlns="" w="9525">
+                <a14:hiddenLine xmlns="" xmlns:a14="http://schemas.microsoft.com/office/drawing/2010/main" w="9525">
                   <a:solidFill>
                     <a:srgbClr val="000000"/>
                   </a:solidFill>
@@ -3826,7 +3826,7 @@
             </a:ln>
             <a:extLst>
               <a:ext uri="{91240B29-F687-4f45-9708-019B960494DF}">
-                <a14:hiddenLine xmlns:a14="http://schemas.microsoft.com/office/drawing/2010/main" xmlns="" w="9525">
+                <a14:hiddenLine xmlns="" xmlns:a14="http://schemas.microsoft.com/office/drawing/2010/main" w="9525">
                   <a:solidFill>
                     <a:srgbClr val="000000"/>
                   </a:solidFill>
@@ -3916,7 +3916,7 @@
             </a:ln>
             <a:extLst>
               <a:ext uri="{91240B29-F687-4f45-9708-019B960494DF}">
-                <a14:hiddenLine xmlns:a14="http://schemas.microsoft.com/office/drawing/2010/main" xmlns="" w="9525">
+                <a14:hiddenLine xmlns="" xmlns:a14="http://schemas.microsoft.com/office/drawing/2010/main" w="9525">
                   <a:solidFill>
                     <a:srgbClr val="000000"/>
                   </a:solidFill>
@@ -3978,7 +3978,7 @@
             </a:ln>
             <a:extLst>
               <a:ext uri="{91240B29-F687-4f45-9708-019B960494DF}">
-                <a14:hiddenLine xmlns:a14="http://schemas.microsoft.com/office/drawing/2010/main" xmlns="" w="9525">
+                <a14:hiddenLine xmlns="" xmlns:a14="http://schemas.microsoft.com/office/drawing/2010/main" w="9525">
                   <a:solidFill>
                     <a:srgbClr val="000000"/>
                   </a:solidFill>
@@ -4098,7 +4098,7 @@
             </a:ln>
             <a:extLst>
               <a:ext uri="{91240B29-F687-4f45-9708-019B960494DF}">
-                <a14:hiddenLine xmlns:a14="http://schemas.microsoft.com/office/drawing/2010/main" xmlns="" w="9525">
+                <a14:hiddenLine xmlns="" xmlns:a14="http://schemas.microsoft.com/office/drawing/2010/main" w="9525">
                   <a:solidFill>
                     <a:srgbClr val="000000"/>
                   </a:solidFill>
@@ -4166,7 +4166,7 @@
             </a:ln>
             <a:extLst>
               <a:ext uri="{91240B29-F687-4f45-9708-019B960494DF}">
-                <a14:hiddenLine xmlns:a14="http://schemas.microsoft.com/office/drawing/2010/main" xmlns="" w="9525">
+                <a14:hiddenLine xmlns="" xmlns:a14="http://schemas.microsoft.com/office/drawing/2010/main" w="9525">
                   <a:solidFill>
                     <a:srgbClr val="000000"/>
                   </a:solidFill>
@@ -4256,7 +4256,7 @@
             </a:ln>
             <a:extLst>
               <a:ext uri="{91240B29-F687-4f45-9708-019B960494DF}">
-                <a14:hiddenLine xmlns:a14="http://schemas.microsoft.com/office/drawing/2010/main" xmlns="" w="9525">
+                <a14:hiddenLine xmlns="" xmlns:a14="http://schemas.microsoft.com/office/drawing/2010/main" w="9525">
                   <a:solidFill>
                     <a:srgbClr val="000000"/>
                   </a:solidFill>
@@ -9063,7 +9063,7 @@
           <a:noFill/>
           <a:extLst>
             <a:ext uri="{909E8E84-426E-40dd-AFC4-6F175D3DCCD1}">
-              <a14:hiddenFill xmlns:a14="http://schemas.microsoft.com/office/drawing/2010/main" xmlns="">
+              <a14:hiddenFill xmlns="" xmlns:a14="http://schemas.microsoft.com/office/drawing/2010/main">
                 <a:solidFill>
                   <a:srgbClr val="FFFFFF"/>
                 </a:solidFill>
@@ -9137,7 +9137,7 @@
               </a:ln>
               <a:extLst>
                 <a:ext uri="{91240B29-F687-4f45-9708-019B960494DF}">
-                  <a14:hiddenLine xmlns:a14="http://schemas.microsoft.com/office/drawing/2010/main" xmlns="" w="9525">
+                  <a14:hiddenLine xmlns="" xmlns:a14="http://schemas.microsoft.com/office/drawing/2010/main" w="9525">
                     <a:solidFill>
                       <a:srgbClr val="000000"/>
                     </a:solidFill>
@@ -9227,7 +9227,7 @@
               </a:ln>
               <a:extLst>
                 <a:ext uri="{91240B29-F687-4f45-9708-019B960494DF}">
-                  <a14:hiddenLine xmlns:a14="http://schemas.microsoft.com/office/drawing/2010/main" xmlns="" w="9525">
+                  <a14:hiddenLine xmlns="" xmlns:a14="http://schemas.microsoft.com/office/drawing/2010/main" w="9525">
                     <a:solidFill>
                       <a:srgbClr val="000000"/>
                     </a:solidFill>
@@ -9317,7 +9317,7 @@
               </a:ln>
               <a:extLst>
                 <a:ext uri="{91240B29-F687-4f45-9708-019B960494DF}">
-                  <a14:hiddenLine xmlns:a14="http://schemas.microsoft.com/office/drawing/2010/main" xmlns="" w="9525">
+                  <a14:hiddenLine xmlns="" xmlns:a14="http://schemas.microsoft.com/office/drawing/2010/main" w="9525">
                     <a:solidFill>
                       <a:srgbClr val="000000"/>
                     </a:solidFill>
@@ -9379,7 +9379,7 @@
               </a:ln>
               <a:extLst>
                 <a:ext uri="{91240B29-F687-4f45-9708-019B960494DF}">
-                  <a14:hiddenLine xmlns:a14="http://schemas.microsoft.com/office/drawing/2010/main" xmlns="" w="9525">
+                  <a14:hiddenLine xmlns="" xmlns:a14="http://schemas.microsoft.com/office/drawing/2010/main" w="9525">
                     <a:solidFill>
                       <a:srgbClr val="000000"/>
                     </a:solidFill>
@@ -9469,7 +9469,7 @@
               </a:ln>
               <a:extLst>
                 <a:ext uri="{91240B29-F687-4f45-9708-019B960494DF}">
-                  <a14:hiddenLine xmlns:a14="http://schemas.microsoft.com/office/drawing/2010/main" xmlns="" w="9525">
+                  <a14:hiddenLine xmlns="" xmlns:a14="http://schemas.microsoft.com/office/drawing/2010/main" w="9525">
                     <a:solidFill>
                       <a:srgbClr val="000000"/>
                     </a:solidFill>
@@ -9531,7 +9531,7 @@
               </a:ln>
               <a:extLst>
                 <a:ext uri="{91240B29-F687-4f45-9708-019B960494DF}">
-                  <a14:hiddenLine xmlns:a14="http://schemas.microsoft.com/office/drawing/2010/main" xmlns="" w="9525">
+                  <a14:hiddenLine xmlns="" xmlns:a14="http://schemas.microsoft.com/office/drawing/2010/main" w="9525">
                     <a:solidFill>
                       <a:srgbClr val="000000"/>
                     </a:solidFill>
@@ -9593,7 +9593,7 @@
               </a:ln>
               <a:extLst>
                 <a:ext uri="{91240B29-F687-4f45-9708-019B960494DF}">
-                  <a14:hiddenLine xmlns:a14="http://schemas.microsoft.com/office/drawing/2010/main" xmlns="" w="9525">
+                  <a14:hiddenLine xmlns="" xmlns:a14="http://schemas.microsoft.com/office/drawing/2010/main" w="9525">
                     <a:solidFill>
                       <a:srgbClr val="000000"/>
                     </a:solidFill>
@@ -9683,7 +9683,7 @@
               </a:ln>
               <a:extLst>
                 <a:ext uri="{91240B29-F687-4f45-9708-019B960494DF}">
-                  <a14:hiddenLine xmlns:a14="http://schemas.microsoft.com/office/drawing/2010/main" xmlns="" w="9525">
+                  <a14:hiddenLine xmlns="" xmlns:a14="http://schemas.microsoft.com/office/drawing/2010/main" w="9525">
                     <a:solidFill>
                       <a:srgbClr val="000000"/>
                     </a:solidFill>
@@ -9773,7 +9773,7 @@
               </a:ln>
               <a:extLst>
                 <a:ext uri="{91240B29-F687-4f45-9708-019B960494DF}">
-                  <a14:hiddenLine xmlns:a14="http://schemas.microsoft.com/office/drawing/2010/main" xmlns="" w="9525">
+                  <a14:hiddenLine xmlns="" xmlns:a14="http://schemas.microsoft.com/office/drawing/2010/main" w="9525">
                     <a:solidFill>
                       <a:srgbClr val="000000"/>
                     </a:solidFill>
@@ -9835,7 +9835,7 @@
               </a:ln>
               <a:extLst>
                 <a:ext uri="{91240B29-F687-4f45-9708-019B960494DF}">
-                  <a14:hiddenLine xmlns:a14="http://schemas.microsoft.com/office/drawing/2010/main" xmlns="" w="9525">
+                  <a14:hiddenLine xmlns="" xmlns:a14="http://schemas.microsoft.com/office/drawing/2010/main" w="9525">
                     <a:solidFill>
                       <a:srgbClr val="000000"/>
                     </a:solidFill>
@@ -9945,7 +9945,7 @@
               </a:ln>
               <a:extLst>
                 <a:ext uri="{91240B29-F687-4f45-9708-019B960494DF}">
-                  <a14:hiddenLine xmlns:a14="http://schemas.microsoft.com/office/drawing/2010/main" xmlns="" w="9525">
+                  <a14:hiddenLine xmlns="" xmlns:a14="http://schemas.microsoft.com/office/drawing/2010/main" w="9525">
                     <a:solidFill>
                       <a:srgbClr val="000000"/>
                     </a:solidFill>
@@ -10029,7 +10029,7 @@
               </a:ln>
               <a:extLst>
                 <a:ext uri="{91240B29-F687-4f45-9708-019B960494DF}">
-                  <a14:hiddenLine xmlns:a14="http://schemas.microsoft.com/office/drawing/2010/main" xmlns="" w="9525">
+                  <a14:hiddenLine xmlns="" xmlns:a14="http://schemas.microsoft.com/office/drawing/2010/main" w="9525">
                     <a:solidFill>
                       <a:srgbClr val="000000"/>
                     </a:solidFill>
@@ -10091,7 +10091,7 @@
               </a:ln>
               <a:extLst>
                 <a:ext uri="{91240B29-F687-4f45-9708-019B960494DF}">
-                  <a14:hiddenLine xmlns:a14="http://schemas.microsoft.com/office/drawing/2010/main" xmlns="" w="9525">
+                  <a14:hiddenLine xmlns="" xmlns:a14="http://schemas.microsoft.com/office/drawing/2010/main" w="9525">
                     <a:solidFill>
                       <a:srgbClr val="000000"/>
                     </a:solidFill>
@@ -10153,7 +10153,7 @@
               </a:ln>
               <a:extLst>
                 <a:ext uri="{91240B29-F687-4f45-9708-019B960494DF}">
-                  <a14:hiddenLine xmlns:a14="http://schemas.microsoft.com/office/drawing/2010/main" xmlns="" w="9525">
+                  <a14:hiddenLine xmlns="" xmlns:a14="http://schemas.microsoft.com/office/drawing/2010/main" w="9525">
                     <a:solidFill>
                       <a:srgbClr val="000000"/>
                     </a:solidFill>
@@ -10243,7 +10243,7 @@
               </a:ln>
               <a:extLst>
                 <a:ext uri="{91240B29-F687-4f45-9708-019B960494DF}">
-                  <a14:hiddenLine xmlns:a14="http://schemas.microsoft.com/office/drawing/2010/main" xmlns="" w="9525">
+                  <a14:hiddenLine xmlns="" xmlns:a14="http://schemas.microsoft.com/office/drawing/2010/main" w="9525">
                     <a:solidFill>
                       <a:srgbClr val="000000"/>
                     </a:solidFill>
@@ -10277,7 +10277,7 @@
               </a:ln>
               <a:extLst>
                 <a:ext uri="{91240B29-F687-4f45-9708-019B960494DF}">
-                  <a14:hiddenLine xmlns:a14="http://schemas.microsoft.com/office/drawing/2010/main" xmlns="" w="9525">
+                  <a14:hiddenLine xmlns="" xmlns:a14="http://schemas.microsoft.com/office/drawing/2010/main" w="9525">
                     <a:solidFill>
                       <a:srgbClr val="000000"/>
                     </a:solidFill>
@@ -10342,7 +10342,7 @@
               </a:ln>
               <a:extLst>
                 <a:ext uri="{91240B29-F687-4f45-9708-019B960494DF}">
-                  <a14:hiddenLine xmlns:a14="http://schemas.microsoft.com/office/drawing/2010/main" xmlns="" w="9525">
+                  <a14:hiddenLine xmlns="" xmlns:a14="http://schemas.microsoft.com/office/drawing/2010/main" w="9525">
                     <a:solidFill>
                       <a:srgbClr val="000000"/>
                     </a:solidFill>
@@ -10432,7 +10432,7 @@
               </a:ln>
               <a:extLst>
                 <a:ext uri="{91240B29-F687-4f45-9708-019B960494DF}">
-                  <a14:hiddenLine xmlns:a14="http://schemas.microsoft.com/office/drawing/2010/main" xmlns="" w="9525">
+                  <a14:hiddenLine xmlns="" xmlns:a14="http://schemas.microsoft.com/office/drawing/2010/main" w="9525">
                     <a:solidFill>
                       <a:srgbClr val="000000"/>
                     </a:solidFill>
@@ -10494,7 +10494,7 @@
               </a:ln>
               <a:extLst>
                 <a:ext uri="{91240B29-F687-4f45-9708-019B960494DF}">
-                  <a14:hiddenLine xmlns:a14="http://schemas.microsoft.com/office/drawing/2010/main" xmlns="" w="9525">
+                  <a14:hiddenLine xmlns="" xmlns:a14="http://schemas.microsoft.com/office/drawing/2010/main" w="9525">
                     <a:solidFill>
                       <a:srgbClr val="000000"/>
                     </a:solidFill>
@@ -10584,7 +10584,7 @@
               </a:ln>
               <a:extLst>
                 <a:ext uri="{91240B29-F687-4f45-9708-019B960494DF}">
-                  <a14:hiddenLine xmlns:a14="http://schemas.microsoft.com/office/drawing/2010/main" xmlns="" w="9525">
+                  <a14:hiddenLine xmlns="" xmlns:a14="http://schemas.microsoft.com/office/drawing/2010/main" w="9525">
                     <a:solidFill>
                       <a:srgbClr val="000000"/>
                     </a:solidFill>
@@ -10649,7 +10649,7 @@
               </a:ln>
               <a:extLst>
                 <a:ext uri="{91240B29-F687-4f45-9708-019B960494DF}">
-                  <a14:hiddenLine xmlns:a14="http://schemas.microsoft.com/office/drawing/2010/main" xmlns="" w="9525">
+                  <a14:hiddenLine xmlns="" xmlns:a14="http://schemas.microsoft.com/office/drawing/2010/main" w="9525">
                     <a:solidFill>
                       <a:srgbClr val="000000"/>
                     </a:solidFill>
@@ -10711,7 +10711,7 @@
               </a:ln>
               <a:extLst>
                 <a:ext uri="{91240B29-F687-4f45-9708-019B960494DF}">
-                  <a14:hiddenLine xmlns:a14="http://schemas.microsoft.com/office/drawing/2010/main" xmlns="" w="9525">
+                  <a14:hiddenLine xmlns="" xmlns:a14="http://schemas.microsoft.com/office/drawing/2010/main" w="9525">
                     <a:solidFill>
                       <a:srgbClr val="000000"/>
                     </a:solidFill>
@@ -10801,7 +10801,7 @@
               </a:ln>
               <a:extLst>
                 <a:ext uri="{91240B29-F687-4f45-9708-019B960494DF}">
-                  <a14:hiddenLine xmlns:a14="http://schemas.microsoft.com/office/drawing/2010/main" xmlns="" w="9525">
+                  <a14:hiddenLine xmlns="" xmlns:a14="http://schemas.microsoft.com/office/drawing/2010/main" w="9525">
                     <a:solidFill>
                       <a:srgbClr val="000000"/>
                     </a:solidFill>
@@ -10891,7 +10891,7 @@
               </a:ln>
               <a:extLst>
                 <a:ext uri="{91240B29-F687-4f45-9708-019B960494DF}">
-                  <a14:hiddenLine xmlns:a14="http://schemas.microsoft.com/office/drawing/2010/main" xmlns="" w="9525">
+                  <a14:hiddenLine xmlns="" xmlns:a14="http://schemas.microsoft.com/office/drawing/2010/main" w="9525">
                     <a:solidFill>
                       <a:srgbClr val="000000"/>
                     </a:solidFill>
@@ -10956,7 +10956,7 @@
               </a:ln>
               <a:extLst>
                 <a:ext uri="{91240B29-F687-4f45-9708-019B960494DF}">
-                  <a14:hiddenLine xmlns:a14="http://schemas.microsoft.com/office/drawing/2010/main" xmlns="" w="9525">
+                  <a14:hiddenLine xmlns="" xmlns:a14="http://schemas.microsoft.com/office/drawing/2010/main" w="9525">
                     <a:solidFill>
                       <a:srgbClr val="000000"/>
                     </a:solidFill>
@@ -11076,7 +11076,7 @@
               </a:ln>
               <a:extLst>
                 <a:ext uri="{91240B29-F687-4f45-9708-019B960494DF}">
-                  <a14:hiddenLine xmlns:a14="http://schemas.microsoft.com/office/drawing/2010/main" xmlns="" w="9525">
+                  <a14:hiddenLine xmlns="" xmlns:a14="http://schemas.microsoft.com/office/drawing/2010/main" w="9525">
                     <a:solidFill>
                       <a:srgbClr val="000000"/>
                     </a:solidFill>
@@ -11174,7 +11174,7 @@
               </a:ln>
               <a:extLst>
                 <a:ext uri="{91240B29-F687-4f45-9708-019B960494DF}">
-                  <a14:hiddenLine xmlns:a14="http://schemas.microsoft.com/office/drawing/2010/main" xmlns="" w="9525">
+                  <a14:hiddenLine xmlns="" xmlns:a14="http://schemas.microsoft.com/office/drawing/2010/main" w="9525">
                     <a:solidFill>
                       <a:srgbClr val="000000"/>
                     </a:solidFill>
@@ -11289,7 +11289,7 @@
               </a:ln>
               <a:extLst>
                 <a:ext uri="{91240B29-F687-4f45-9708-019B960494DF}">
-                  <a14:hiddenLine xmlns:a14="http://schemas.microsoft.com/office/drawing/2010/main" xmlns="" w="9525">
+                  <a14:hiddenLine xmlns="" xmlns:a14="http://schemas.microsoft.com/office/drawing/2010/main" w="9525">
                     <a:solidFill>
                       <a:srgbClr val="000000"/>
                     </a:solidFill>
@@ -11379,7 +11379,7 @@
               </a:ln>
               <a:extLst>
                 <a:ext uri="{91240B29-F687-4f45-9708-019B960494DF}">
-                  <a14:hiddenLine xmlns:a14="http://schemas.microsoft.com/office/drawing/2010/main" xmlns="" w="9525">
+                  <a14:hiddenLine xmlns="" xmlns:a14="http://schemas.microsoft.com/office/drawing/2010/main" w="9525">
                     <a:solidFill>
                       <a:srgbClr val="000000"/>
                     </a:solidFill>
@@ -11444,7 +11444,7 @@
               </a:ln>
               <a:extLst>
                 <a:ext uri="{91240B29-F687-4f45-9708-019B960494DF}">
-                  <a14:hiddenLine xmlns:a14="http://schemas.microsoft.com/office/drawing/2010/main" xmlns="" w="9525">
+                  <a14:hiddenLine xmlns="" xmlns:a14="http://schemas.microsoft.com/office/drawing/2010/main" w="9525">
                     <a:solidFill>
                       <a:srgbClr val="000000"/>
                     </a:solidFill>
@@ -11534,7 +11534,7 @@
               </a:ln>
               <a:extLst>
                 <a:ext uri="{91240B29-F687-4f45-9708-019B960494DF}">
-                  <a14:hiddenLine xmlns:a14="http://schemas.microsoft.com/office/drawing/2010/main" xmlns="" w="9525">
+                  <a14:hiddenLine xmlns="" xmlns:a14="http://schemas.microsoft.com/office/drawing/2010/main" w="9525">
                     <a:solidFill>
                       <a:srgbClr val="000000"/>
                     </a:solidFill>
@@ -11602,7 +11602,7 @@
               </a:ln>
               <a:extLst>
                 <a:ext uri="{91240B29-F687-4f45-9708-019B960494DF}">
-                  <a14:hiddenLine xmlns:a14="http://schemas.microsoft.com/office/drawing/2010/main" xmlns="" w="9525">
+                  <a14:hiddenLine xmlns="" xmlns:a14="http://schemas.microsoft.com/office/drawing/2010/main" w="9525">
                     <a:solidFill>
                       <a:srgbClr val="000000"/>
                     </a:solidFill>
@@ -11692,7 +11692,7 @@
               </a:ln>
               <a:extLst>
                 <a:ext uri="{91240B29-F687-4f45-9708-019B960494DF}">
-                  <a14:hiddenLine xmlns:a14="http://schemas.microsoft.com/office/drawing/2010/main" xmlns="" w="9525">
+                  <a14:hiddenLine xmlns="" xmlns:a14="http://schemas.microsoft.com/office/drawing/2010/main" w="9525">
                     <a:solidFill>
                       <a:srgbClr val="000000"/>
                     </a:solidFill>
@@ -11760,7 +11760,7 @@
               </a:ln>
               <a:extLst>
                 <a:ext uri="{91240B29-F687-4f45-9708-019B960494DF}">
-                  <a14:hiddenLine xmlns:a14="http://schemas.microsoft.com/office/drawing/2010/main" xmlns="" w="9525">
+                  <a14:hiddenLine xmlns="" xmlns:a14="http://schemas.microsoft.com/office/drawing/2010/main" w="9525">
                     <a:solidFill>
                       <a:srgbClr val="000000"/>
                     </a:solidFill>
@@ -11850,7 +11850,7 @@
               </a:ln>
               <a:extLst>
                 <a:ext uri="{91240B29-F687-4f45-9708-019B960494DF}">
-                  <a14:hiddenLine xmlns:a14="http://schemas.microsoft.com/office/drawing/2010/main" xmlns="" w="9525">
+                  <a14:hiddenLine xmlns="" xmlns:a14="http://schemas.microsoft.com/office/drawing/2010/main" w="9525">
                     <a:solidFill>
                       <a:srgbClr val="000000"/>
                     </a:solidFill>
@@ -11884,7 +11884,7 @@
               </a:ln>
               <a:extLst>
                 <a:ext uri="{91240B29-F687-4f45-9708-019B960494DF}">
-                  <a14:hiddenLine xmlns:a14="http://schemas.microsoft.com/office/drawing/2010/main" xmlns="" w="9525">
+                  <a14:hiddenLine xmlns="" xmlns:a14="http://schemas.microsoft.com/office/drawing/2010/main" w="9525">
                     <a:solidFill>
                       <a:srgbClr val="000000"/>
                     </a:solidFill>
@@ -12758,15 +12758,15 @@
             <a:pPr lvl="1"/>
             <a:r>
               <a:rPr lang="en-US" altLang="en-US" dirty="0"/>
-              <a:t>When requesting approval, the request will either automatically </a:t>
+              <a:t>When requesting approval, the request will either automatically be sent to any of the approvers for that software or the user can manually </a:t>
             </a:r>
             <a:r>
               <a:rPr lang="en-US" altLang="en-US"/>
-              <a:t>be sent to </a:t>
+              <a:t>select which </a:t>
             </a:r>
             <a:r>
               <a:rPr lang="en-US" altLang="en-US" dirty="0"/>
-              <a:t>any of the approvers for that software or the user can manually select with approver they would like.</a:t>
+              <a:t>approver they would like.</a:t>
             </a:r>
           </a:p>
           <a:p>

</xml_diff>